<commit_message>
Update slide and doc.
</commit_message>
<xml_diff>
--- a/Text Localization.pptx
+++ b/Text Localization.pptx
@@ -5,7 +5,7 @@
     <p:sldMasterId id="2147483696" r:id="rId1"/>
   </p:sldMasterIdLst>
   <p:notesMasterIdLst>
-    <p:notesMasterId r:id="rId25"/>
+    <p:notesMasterId r:id="rId34"/>
   </p:notesMasterIdLst>
   <p:sldIdLst>
     <p:sldId id="272" r:id="rId2"/>
@@ -31,6 +31,15 @@
     <p:sldId id="332" r:id="rId22"/>
     <p:sldId id="333" r:id="rId23"/>
     <p:sldId id="315" r:id="rId24"/>
+    <p:sldId id="334" r:id="rId25"/>
+    <p:sldId id="335" r:id="rId26"/>
+    <p:sldId id="337" r:id="rId27"/>
+    <p:sldId id="336" r:id="rId28"/>
+    <p:sldId id="338" r:id="rId29"/>
+    <p:sldId id="339" r:id="rId30"/>
+    <p:sldId id="340" r:id="rId31"/>
+    <p:sldId id="341" r:id="rId32"/>
+    <p:sldId id="342" r:id="rId33"/>
   </p:sldIdLst>
   <p:sldSz cx="12192000" cy="6858000"/>
   <p:notesSz cx="6858000" cy="9144000"/>
@@ -6747,7 +6756,7 @@
               <a:rPr lang="fa-IR" dirty="0" smtClean="0">
                 <a:cs typeface="B Nazanin" panose="00000400000000000000" pitchFamily="2" charset="-78"/>
               </a:rPr>
-              <a:t>تابع هزینه</a:t>
+              <a:t>تابع خطا</a:t>
             </a:r>
             <a:endParaRPr lang="en-US" dirty="0">
               <a:cs typeface="B Nazanin" panose="00000400000000000000" pitchFamily="2" charset="-78"/>
@@ -16068,8 +16077,8 @@
           </a:p>
         </p:txBody>
       </p:sp>
-      <mc:AlternateContent xmlns:mc="http://schemas.openxmlformats.org/markup-compatibility/2006">
-        <mc:Choice xmlns:a14="http://schemas.microsoft.com/office/drawing/2010/main" Requires="a14">
+      <mc:AlternateContent xmlns:mc="http://schemas.openxmlformats.org/markup-compatibility/2006" xmlns:a14="http://schemas.microsoft.com/office/drawing/2010/main">
+        <mc:Choice Requires="a14">
           <p:sp>
             <p:nvSpPr>
               <p:cNvPr id="5" name="Rectangle 4"/>
@@ -16091,6 +16100,7 @@
               </a:bodyPr>
               <a:lstStyle/>
               <a:p>
+                <a:pPr/>
                 <a14:m>
                   <m:oMathPara xmlns:m="http://schemas.openxmlformats.org/officeDocument/2006/math">
                     <m:oMathParaPr>
@@ -16100,7 +16110,7 @@
                       <m:sSub>
                         <m:sSubPr>
                           <m:ctrlPr>
-                            <a:rPr lang="en-US" sz="2400">
+                            <a:rPr lang="en-US" sz="2400" i="1">
                               <a:latin typeface="Cambria Math" panose="02040503050406030204" pitchFamily="18" charset="0"/>
                             </a:rPr>
                           </m:ctrlPr>
@@ -16427,7 +16437,7 @@
             </p:txBody>
           </p:sp>
         </mc:Choice>
-        <mc:Fallback>
+        <mc:Fallback xmlns="">
           <p:sp>
             <p:nvSpPr>
               <p:cNvPr id="5" name="Rectangle 4"/>
@@ -16703,8 +16713,8 @@
           </a:p>
         </p:txBody>
       </p:sp>
-      <mc:AlternateContent xmlns:mc="http://schemas.openxmlformats.org/markup-compatibility/2006">
-        <mc:Choice xmlns:a14="http://schemas.microsoft.com/office/drawing/2010/main" Requires="a14">
+      <mc:AlternateContent xmlns:mc="http://schemas.openxmlformats.org/markup-compatibility/2006" xmlns:a14="http://schemas.microsoft.com/office/drawing/2010/main">
+        <mc:Choice Requires="a14">
           <p:sp>
             <p:nvSpPr>
               <p:cNvPr id="11" name="TextBox 10"/>
@@ -16764,6 +16774,7 @@
                             <a:solidFill>
                               <a:srgbClr val="FF0000"/>
                             </a:solidFill>
+                            <a:latin typeface="Cambria Math" panose="02040503050406030204" pitchFamily="18" charset="0"/>
                           </a:rPr>
                         </m:ctrlPr>
                       </m:sSubPr>
@@ -16773,6 +16784,7 @@
                             <a:solidFill>
                               <a:srgbClr val="FF0000"/>
                             </a:solidFill>
+                            <a:latin typeface="Cambria Math" panose="02040503050406030204" pitchFamily="18" charset="0"/>
                           </a:rPr>
                           <m:t>𝐾</m:t>
                         </m:r>
@@ -16783,6 +16795,7 @@
                             <a:solidFill>
                               <a:srgbClr val="FF0000"/>
                             </a:solidFill>
+                            <a:latin typeface="Cambria Math" panose="02040503050406030204" pitchFamily="18" charset="0"/>
                           </a:rPr>
                           <m:t>𝑖</m:t>
                         </m:r>
@@ -16799,17 +16812,11 @@
                   </a:rPr>
                   <a:t> </a:t>
                 </a:r>
-                <a:endParaRPr lang="en-US" sz="2000" dirty="0">
-                  <a:solidFill>
-                    <a:srgbClr val="FF0000"/>
-                  </a:solidFill>
-                  <a:cs typeface="B Nazanin" panose="00000400000000000000" pitchFamily="2" charset="-78"/>
-                </a:endParaRPr>
               </a:p>
             </p:txBody>
           </p:sp>
         </mc:Choice>
-        <mc:Fallback>
+        <mc:Fallback xmlns="">
           <p:sp>
             <p:nvSpPr>
               <p:cNvPr id="11" name="TextBox 10"/>
@@ -16848,8 +16855,8 @@
           </p:sp>
         </mc:Fallback>
       </mc:AlternateContent>
-      <mc:AlternateContent xmlns:mc="http://schemas.openxmlformats.org/markup-compatibility/2006">
-        <mc:Choice xmlns:a14="http://schemas.microsoft.com/office/drawing/2010/main" Requires="a14">
+      <mc:AlternateContent xmlns:mc="http://schemas.openxmlformats.org/markup-compatibility/2006" xmlns:a14="http://schemas.microsoft.com/office/drawing/2010/main">
+        <mc:Choice Requires="a14">
           <p:sp>
             <p:nvSpPr>
               <p:cNvPr id="12" name="Rectangle 11"/>
@@ -16871,6 +16878,7 @@
               </a:bodyPr>
               <a:lstStyle/>
               <a:p>
+                <a:pPr/>
                 <a14:m>
                   <m:oMathPara xmlns:m="http://schemas.openxmlformats.org/officeDocument/2006/math">
                     <m:oMathParaPr>
@@ -17143,7 +17151,7 @@
             </p:txBody>
           </p:sp>
         </mc:Choice>
-        <mc:Fallback>
+        <mc:Fallback xmlns="">
           <p:sp>
             <p:nvSpPr>
               <p:cNvPr id="12" name="Rectangle 11"/>
@@ -17222,12 +17230,6 @@
               </a:rPr>
               <a:t>p </a:t>
             </a:r>
-            <a:endParaRPr lang="en-US" sz="2000" dirty="0">
-              <a:solidFill>
-                <a:srgbClr val="FF0000"/>
-              </a:solidFill>
-              <a:cs typeface="B Nazanin" panose="00000400000000000000" pitchFamily="2" charset="-78"/>
-            </a:endParaRPr>
           </a:p>
         </p:txBody>
       </p:sp>
@@ -17369,8 +17371,8 @@
           </a:p>
         </p:txBody>
       </p:sp>
-      <mc:AlternateContent xmlns:mc="http://schemas.openxmlformats.org/markup-compatibility/2006">
-        <mc:Choice xmlns:a14="http://schemas.microsoft.com/office/drawing/2010/main" Requires="a14">
+      <mc:AlternateContent xmlns:mc="http://schemas.openxmlformats.org/markup-compatibility/2006" xmlns:a14="http://schemas.microsoft.com/office/drawing/2010/main">
+        <mc:Choice Requires="a14">
           <p:sp>
             <p:nvSpPr>
               <p:cNvPr id="18" name="TextBox 17"/>
@@ -17412,6 +17414,7 @@
                             <a:solidFill>
                               <a:srgbClr val="FF0000"/>
                             </a:solidFill>
+                            <a:latin typeface="Cambria Math" panose="02040503050406030204" pitchFamily="18" charset="0"/>
                           </a:rPr>
                         </m:ctrlPr>
                       </m:sSubPr>
@@ -17421,6 +17424,7 @@
                             <a:solidFill>
                               <a:srgbClr val="FF0000"/>
                             </a:solidFill>
+                            <a:latin typeface="Cambria Math" panose="02040503050406030204" pitchFamily="18" charset="0"/>
                           </a:rPr>
                           <m:t>𝐾</m:t>
                         </m:r>
@@ -17431,6 +17435,7 @@
                             <a:solidFill>
                               <a:srgbClr val="FF0000"/>
                             </a:solidFill>
+                            <a:latin typeface="Cambria Math" panose="02040503050406030204" pitchFamily="18" charset="0"/>
                           </a:rPr>
                           <m:t>𝑖</m:t>
                         </m:r>
@@ -17448,7 +17453,7 @@
             </p:txBody>
           </p:sp>
         </mc:Choice>
-        <mc:Fallback>
+        <mc:Fallback xmlns="">
           <p:sp>
             <p:nvSpPr>
               <p:cNvPr id="18" name="TextBox 17"/>
@@ -18871,8 +18876,8 @@
           </a:p>
         </p:txBody>
       </p:sp>
-      <mc:AlternateContent xmlns:mc="http://schemas.openxmlformats.org/markup-compatibility/2006">
-        <mc:Choice xmlns:a14="http://schemas.microsoft.com/office/drawing/2010/main" Requires="a14">
+      <mc:AlternateContent xmlns:mc="http://schemas.openxmlformats.org/markup-compatibility/2006" xmlns:a14="http://schemas.microsoft.com/office/drawing/2010/main">
+        <mc:Choice Requires="a14">
           <p:sp>
             <p:nvSpPr>
               <p:cNvPr id="3" name="Content Placeholder 2"/>
@@ -18956,18 +18961,24 @@
                     <m:sSub>
                       <m:sSubPr>
                         <m:ctrlPr>
-                          <a:rPr lang="en-US" sz="2400" i="1"/>
+                          <a:rPr lang="en-US" sz="2400" i="1">
+                            <a:latin typeface="Cambria Math" panose="02040503050406030204" pitchFamily="18" charset="0"/>
+                          </a:rPr>
                         </m:ctrlPr>
                       </m:sSubPr>
                       <m:e>
                         <m:r>
-                          <a:rPr lang="en-US" sz="2400" i="1"/>
+                          <a:rPr lang="en-US" sz="2400" i="1">
+                            <a:latin typeface="Cambria Math" panose="02040503050406030204" pitchFamily="18" charset="0"/>
+                          </a:rPr>
                           <m:t>ℒ</m:t>
                         </m:r>
                       </m:e>
                       <m:sub>
                         <m:r>
-                          <a:rPr lang="en-US" sz="2400" i="1"/>
+                          <a:rPr lang="en-US" sz="2400" i="1">
+                            <a:latin typeface="Cambria Math" panose="02040503050406030204" pitchFamily="18" charset="0"/>
+                          </a:rPr>
                           <m:t>𝑑𝑖𝑠</m:t>
                         </m:r>
                       </m:sub>
@@ -18997,7 +19008,9 @@
                     <m:sSub>
                       <m:sSubPr>
                         <m:ctrlPr>
-                          <a:rPr lang="en-US" sz="2400" i="1"/>
+                          <a:rPr lang="en-US" sz="2400" i="1">
+                            <a:latin typeface="Cambria Math" panose="02040503050406030204" pitchFamily="18" charset="0"/>
+                          </a:rPr>
                         </m:ctrlPr>
                       </m:sSubPr>
                       <m:e>
@@ -19008,13 +19021,17 @@
                           <m:t> </m:t>
                         </m:r>
                         <m:r>
-                          <a:rPr lang="en-US" sz="2400" i="1"/>
+                          <a:rPr lang="en-US" sz="2400" i="1">
+                            <a:latin typeface="Cambria Math" panose="02040503050406030204" pitchFamily="18" charset="0"/>
+                          </a:rPr>
                           <m:t>𝛿</m:t>
                         </m:r>
                       </m:e>
                       <m:sub>
                         <m:r>
-                          <a:rPr lang="en-US" sz="2400" i="1"/>
+                          <a:rPr lang="en-US" sz="2400" i="1">
+                            <a:latin typeface="Cambria Math" panose="02040503050406030204" pitchFamily="18" charset="0"/>
+                          </a:rPr>
                           <m:t>𝑑𝑖𝑠</m:t>
                         </m:r>
                       </m:sub>
@@ -19064,7 +19081,7 @@
             </p:txBody>
           </p:sp>
         </mc:Choice>
-        <mc:Fallback>
+        <mc:Fallback xmlns="">
           <p:sp>
             <p:nvSpPr>
               <p:cNvPr id="3" name="Content Placeholder 2"/>
@@ -19121,8 +19138,8 @@
           </a:p>
         </p:txBody>
       </p:sp>
-      <mc:AlternateContent xmlns:mc="http://schemas.openxmlformats.org/markup-compatibility/2006">
-        <mc:Choice xmlns:a14="http://schemas.microsoft.com/office/drawing/2010/main" Requires="a14">
+      <mc:AlternateContent xmlns:mc="http://schemas.openxmlformats.org/markup-compatibility/2006" xmlns:a14="http://schemas.microsoft.com/office/drawing/2010/main">
+        <mc:Choice Requires="a14">
           <p:sp>
             <p:nvSpPr>
               <p:cNvPr id="5" name="Rectangle 4"/>
@@ -20189,7 +20206,7 @@
             </p:txBody>
           </p:sp>
         </mc:Choice>
-        <mc:Fallback>
+        <mc:Fallback xmlns="">
           <p:sp>
             <p:nvSpPr>
               <p:cNvPr id="5" name="Rectangle 4"/>
@@ -20658,6 +20675,2839 @@
 </p:sld>
 </file>
 
+<file path=ppt/slides/slide24.xml><?xml version="1.0" encoding="utf-8"?>
+<p:sld xmlns:a="http://schemas.openxmlformats.org/drawingml/2006/main" xmlns:r="http://schemas.openxmlformats.org/officeDocument/2006/relationships" xmlns:p="http://schemas.openxmlformats.org/presentationml/2006/main">
+  <p:cSld>
+    <p:spTree>
+      <p:nvGrpSpPr>
+        <p:cNvPr id="1" name=""/>
+        <p:cNvGrpSpPr/>
+        <p:nvPr/>
+      </p:nvGrpSpPr>
+      <p:grpSpPr>
+        <a:xfrm>
+          <a:off x="0" y="0"/>
+          <a:ext cx="0" cy="0"/>
+          <a:chOff x="0" y="0"/>
+          <a:chExt cx="0" cy="0"/>
+        </a:xfrm>
+      </p:grpSpPr>
+      <p:sp>
+        <p:nvSpPr>
+          <p:cNvPr id="2" name="Title 1"/>
+          <p:cNvSpPr>
+            <a:spLocks noGrp="1"/>
+          </p:cNvSpPr>
+          <p:nvPr>
+            <p:ph type="title"/>
+          </p:nvPr>
+        </p:nvSpPr>
+        <p:spPr/>
+        <p:txBody>
+          <a:bodyPr/>
+          <a:lstStyle/>
+          <a:p>
+            <a:pPr algn="r" rtl="1"/>
+            <a:r>
+              <a:rPr lang="fa-IR" dirty="0" smtClean="0">
+                <a:cs typeface="B Nazanin" panose="00000400000000000000" pitchFamily="2" charset="-78"/>
+              </a:rPr>
+              <a:t>روش </a:t>
+            </a:r>
+            <a:r>
+              <a:rPr lang="fa-IR" dirty="0">
+                <a:cs typeface="B Nazanin" panose="00000400000000000000" pitchFamily="2" charset="-78"/>
+              </a:rPr>
+              <a:t>پیشنهادی این مقاله</a:t>
+            </a:r>
+            <a:endParaRPr lang="en-US" dirty="0"/>
+          </a:p>
+        </p:txBody>
+      </p:sp>
+      <p:sp>
+        <p:nvSpPr>
+          <p:cNvPr id="3" name="Content Placeholder 2"/>
+          <p:cNvSpPr>
+            <a:spLocks noGrp="1"/>
+          </p:cNvSpPr>
+          <p:nvPr>
+            <p:ph idx="1"/>
+          </p:nvPr>
+        </p:nvSpPr>
+        <p:spPr/>
+        <p:txBody>
+          <a:bodyPr>
+            <a:normAutofit fontScale="92500"/>
+          </a:bodyPr>
+          <a:lstStyle/>
+          <a:p>
+            <a:pPr algn="just" rtl="1"/>
+            <a:r>
+              <a:rPr lang="fa-IR" sz="2400" dirty="0">
+                <a:cs typeface="B Nazanin" panose="00000400000000000000" pitchFamily="2" charset="-78"/>
+              </a:rPr>
+              <a:t>روشی که در این مقاله پیشنهاد شده است به این صورت است که </a:t>
+            </a:r>
+            <a:r>
+              <a:rPr lang="fa-IR" sz="2400" dirty="0">
+                <a:solidFill>
+                  <a:srgbClr val="FF0000"/>
+                </a:solidFill>
+                <a:cs typeface="B Nazanin" panose="00000400000000000000" pitchFamily="2" charset="-78"/>
+              </a:rPr>
+              <a:t>مکان هر کاراکتر را به صورت جداگانه </a:t>
+            </a:r>
+            <a:r>
+              <a:rPr lang="fa-IR" sz="2400" dirty="0">
+                <a:cs typeface="B Nazanin" panose="00000400000000000000" pitchFamily="2" charset="-78"/>
+              </a:rPr>
+              <a:t>تشخیص دهد و سپس با </a:t>
+            </a:r>
+            <a:r>
+              <a:rPr lang="fa-IR" sz="2400" dirty="0">
+                <a:solidFill>
+                  <a:srgbClr val="FF0000"/>
+                </a:solidFill>
+                <a:cs typeface="B Nazanin" panose="00000400000000000000" pitchFamily="2" charset="-78"/>
+              </a:rPr>
+              <a:t>ترکیب کاراکتر های </a:t>
+            </a:r>
+            <a:r>
+              <a:rPr lang="fa-IR" sz="2400" dirty="0">
+                <a:cs typeface="B Nazanin" panose="00000400000000000000" pitchFamily="2" charset="-78"/>
+              </a:rPr>
+              <a:t>تشخیص داده شده، مکان متن را مشخص کنند. اسم این روش را </a:t>
+            </a:r>
+            <a:r>
+              <a:rPr lang="en-US" sz="2400" b="1" dirty="0">
+                <a:cs typeface="B Nazanin" panose="00000400000000000000" pitchFamily="2" charset="-78"/>
+              </a:rPr>
+              <a:t>CRAFT</a:t>
+            </a:r>
+            <a:r>
+              <a:rPr lang="fa-IR" sz="2400" dirty="0">
+                <a:cs typeface="B Nazanin" panose="00000400000000000000" pitchFamily="2" charset="-78"/>
+              </a:rPr>
+              <a:t> نامیدند. </a:t>
+            </a:r>
+            <a:endParaRPr lang="en-US" sz="2400" dirty="0" smtClean="0">
+              <a:cs typeface="B Nazanin" panose="00000400000000000000" pitchFamily="2" charset="-78"/>
+            </a:endParaRPr>
+          </a:p>
+          <a:p>
+            <a:pPr algn="just" rtl="1"/>
+            <a:r>
+              <a:rPr lang="fa-IR" sz="2400" dirty="0" smtClean="0">
+                <a:cs typeface="B Nazanin" panose="00000400000000000000" pitchFamily="2" charset="-78"/>
+              </a:rPr>
+              <a:t>خوبی </a:t>
+            </a:r>
+            <a:r>
+              <a:rPr lang="fa-IR" sz="2400" dirty="0">
+                <a:cs typeface="B Nazanin" panose="00000400000000000000" pitchFamily="2" charset="-78"/>
+              </a:rPr>
+              <a:t>این روش این است که می تواند همه اشکال متن، متن های منحی شکل و بد شکل را تشخیص دهد.</a:t>
+            </a:r>
+            <a:endParaRPr lang="en-US" sz="2400" dirty="0">
+              <a:cs typeface="B Nazanin" panose="00000400000000000000" pitchFamily="2" charset="-78"/>
+            </a:endParaRPr>
+          </a:p>
+          <a:p>
+            <a:pPr algn="just" rtl="1"/>
+            <a:r>
+              <a:rPr lang="fa-IR" sz="2400" dirty="0">
+                <a:cs typeface="B Nazanin" panose="00000400000000000000" pitchFamily="2" charset="-78"/>
+              </a:rPr>
+              <a:t>این روش از یک شبکه کانوولوشنی استفاده می کند که دو امتیاز را خروجی می </a:t>
+            </a:r>
+            <a:r>
+              <a:rPr lang="fa-IR" sz="2400" dirty="0" smtClean="0">
+                <a:cs typeface="B Nazanin" panose="00000400000000000000" pitchFamily="2" charset="-78"/>
+              </a:rPr>
+              <a:t>دهد</a:t>
+            </a:r>
+            <a:r>
+              <a:rPr lang="fa-IR" sz="2400" dirty="0">
+                <a:cs typeface="B Nazanin" panose="00000400000000000000" pitchFamily="2" charset="-78"/>
+              </a:rPr>
+              <a:t>:</a:t>
+            </a:r>
+            <a:endParaRPr lang="en-US" sz="2400" dirty="0" smtClean="0">
+              <a:cs typeface="B Nazanin" panose="00000400000000000000" pitchFamily="2" charset="-78"/>
+            </a:endParaRPr>
+          </a:p>
+          <a:p>
+            <a:pPr marL="749808" lvl="1" indent="-457200" algn="just" rtl="1">
+              <a:buFont typeface="+mj-lt"/>
+              <a:buAutoNum type="arabicPeriod"/>
+            </a:pPr>
+            <a:r>
+              <a:rPr lang="fa-IR" sz="2200" b="1" dirty="0" smtClean="0">
+                <a:solidFill>
+                  <a:srgbClr val="00B050"/>
+                </a:solidFill>
+                <a:cs typeface="B Nazanin" panose="00000400000000000000" pitchFamily="2" charset="-78"/>
+              </a:rPr>
+              <a:t>امتیاز </a:t>
+            </a:r>
+            <a:r>
+              <a:rPr lang="fa-IR" sz="2200" b="1" dirty="0">
+                <a:solidFill>
+                  <a:srgbClr val="00B050"/>
+                </a:solidFill>
+                <a:cs typeface="B Nazanin" panose="00000400000000000000" pitchFamily="2" charset="-78"/>
+              </a:rPr>
+              <a:t>ناحیه هر </a:t>
+            </a:r>
+            <a:r>
+              <a:rPr lang="fa-IR" sz="2200" b="1" dirty="0" smtClean="0">
+                <a:solidFill>
+                  <a:srgbClr val="00B050"/>
+                </a:solidFill>
+                <a:cs typeface="B Nazanin" panose="00000400000000000000" pitchFamily="2" charset="-78"/>
+              </a:rPr>
+              <a:t>کاراکتر </a:t>
+            </a:r>
+            <a:r>
+              <a:rPr lang="fa-IR" sz="2200" dirty="0" smtClean="0">
+                <a:cs typeface="B Nazanin" panose="00000400000000000000" pitchFamily="2" charset="-78"/>
+              </a:rPr>
+              <a:t>(</a:t>
+            </a:r>
+            <a:r>
+              <a:rPr lang="en-US" sz="2200" dirty="0" smtClean="0">
+                <a:cs typeface="B Nazanin" panose="00000400000000000000" pitchFamily="2" charset="-78"/>
+              </a:rPr>
+              <a:t>region score</a:t>
+            </a:r>
+            <a:r>
+              <a:rPr lang="fa-IR" sz="2200" dirty="0" smtClean="0">
+                <a:cs typeface="B Nazanin" panose="00000400000000000000" pitchFamily="2" charset="-78"/>
+              </a:rPr>
+              <a:t>) </a:t>
+            </a:r>
+            <a:endParaRPr lang="en-US" sz="2200" dirty="0">
+              <a:cs typeface="B Nazanin" panose="00000400000000000000" pitchFamily="2" charset="-78"/>
+            </a:endParaRPr>
+          </a:p>
+          <a:p>
+            <a:pPr marL="749808" lvl="1" indent="-457200" algn="just" rtl="1">
+              <a:buFont typeface="+mj-lt"/>
+              <a:buAutoNum type="arabicPeriod"/>
+            </a:pPr>
+            <a:r>
+              <a:rPr lang="fa-IR" sz="2200" b="1" dirty="0" smtClean="0">
+                <a:solidFill>
+                  <a:srgbClr val="00B050"/>
+                </a:solidFill>
+                <a:cs typeface="B Nazanin" panose="00000400000000000000" pitchFamily="2" charset="-78"/>
+              </a:rPr>
+              <a:t>امتیاز </a:t>
+            </a:r>
+            <a:r>
+              <a:rPr lang="fa-IR" sz="2200" b="1" dirty="0">
+                <a:solidFill>
+                  <a:srgbClr val="00B050"/>
+                </a:solidFill>
+                <a:cs typeface="B Nazanin" panose="00000400000000000000" pitchFamily="2" charset="-78"/>
+              </a:rPr>
+              <a:t>نزدیکی کاراکترها</a:t>
+            </a:r>
+            <a:r>
+              <a:rPr lang="fa-IR" sz="2200" b="1" dirty="0">
+                <a:solidFill>
+                  <a:schemeClr val="tx1"/>
+                </a:solidFill>
+                <a:cs typeface="B Nazanin" panose="00000400000000000000" pitchFamily="2" charset="-78"/>
+              </a:rPr>
+              <a:t>(</a:t>
+            </a:r>
+            <a:r>
+              <a:rPr lang="en-US" sz="2200" dirty="0">
+                <a:cs typeface="B Nazanin" panose="00000400000000000000" pitchFamily="2" charset="-78"/>
+              </a:rPr>
+              <a:t>affinity score</a:t>
+            </a:r>
+            <a:r>
+              <a:rPr lang="fa-IR" sz="2200" dirty="0" smtClean="0">
+                <a:cs typeface="B Nazanin" panose="00000400000000000000" pitchFamily="2" charset="-78"/>
+              </a:rPr>
+              <a:t>)</a:t>
+            </a:r>
+          </a:p>
+          <a:p>
+            <a:pPr marL="292608" lvl="1" indent="0" algn="just" rtl="1">
+              <a:buNone/>
+            </a:pPr>
+            <a:endParaRPr lang="en-US" sz="2200" dirty="0" smtClean="0">
+              <a:cs typeface="B Nazanin" panose="00000400000000000000" pitchFamily="2" charset="-78"/>
+            </a:endParaRPr>
+          </a:p>
+          <a:p>
+            <a:pPr algn="just" rtl="1"/>
+            <a:r>
+              <a:rPr lang="fa-IR" sz="2400" dirty="0" smtClean="0">
+                <a:cs typeface="B Nazanin" panose="00000400000000000000" pitchFamily="2" charset="-78"/>
+              </a:rPr>
+              <a:t>برای </a:t>
+            </a:r>
+            <a:r>
+              <a:rPr lang="fa-IR" sz="2400" dirty="0">
+                <a:cs typeface="B Nazanin" panose="00000400000000000000" pitchFamily="2" charset="-78"/>
+              </a:rPr>
+              <a:t>جبران مشکل مشخص نبودن مکان کاراکترها در دیتاست اصلی، این مقاله یک یادگیری </a:t>
+            </a:r>
+            <a:r>
+              <a:rPr lang="en-US" sz="2400" dirty="0">
+                <a:solidFill>
+                  <a:srgbClr val="FF0000"/>
+                </a:solidFill>
+                <a:cs typeface="B Nazanin" panose="00000400000000000000" pitchFamily="2" charset="-78"/>
+              </a:rPr>
+              <a:t>weakly-supervised</a:t>
+            </a:r>
+            <a:r>
+              <a:rPr lang="fa-IR" sz="2400" dirty="0">
+                <a:cs typeface="B Nazanin" panose="00000400000000000000" pitchFamily="2" charset="-78"/>
+              </a:rPr>
+              <a:t> را برای تخمین مکان صحیح کاراکترها با استفاده از مکان واقعی کلمات مشخص شده در دیتاست پیشنهاد می دهد.</a:t>
+            </a:r>
+            <a:endParaRPr lang="en-US" sz="2400" dirty="0">
+              <a:cs typeface="B Nazanin" panose="00000400000000000000" pitchFamily="2" charset="-78"/>
+            </a:endParaRPr>
+          </a:p>
+          <a:p>
+            <a:pPr algn="just"/>
+            <a:endParaRPr lang="en-US" sz="2400" dirty="0">
+              <a:cs typeface="B Nazanin" panose="00000400000000000000" pitchFamily="2" charset="-78"/>
+            </a:endParaRPr>
+          </a:p>
+        </p:txBody>
+      </p:sp>
+      <p:sp>
+        <p:nvSpPr>
+          <p:cNvPr id="4" name="Slide Number Placeholder 3"/>
+          <p:cNvSpPr>
+            <a:spLocks noGrp="1"/>
+          </p:cNvSpPr>
+          <p:nvPr>
+            <p:ph type="sldNum" sz="quarter" idx="12"/>
+          </p:nvPr>
+        </p:nvSpPr>
+        <p:spPr/>
+        <p:txBody>
+          <a:bodyPr/>
+          <a:lstStyle/>
+          <a:p>
+            <a:fld id="{18087783-62FF-446C-A2E4-4C6B0B0DE16F}" type="slidenum">
+              <a:rPr lang="en-US" smtClean="0"/>
+              <a:t>24</a:t>
+            </a:fld>
+            <a:endParaRPr lang="en-US"/>
+          </a:p>
+        </p:txBody>
+      </p:sp>
+      <p:sp>
+        <p:nvSpPr>
+          <p:cNvPr id="5" name="Right Arrow 4"/>
+          <p:cNvSpPr/>
+          <p:nvPr/>
+        </p:nvSpPr>
+        <p:spPr>
+          <a:xfrm rot="10800000">
+            <a:off x="5937373" y="3543014"/>
+            <a:ext cx="894944" cy="223736"/>
+          </a:xfrm>
+          <a:prstGeom prst="rightArrow">
+            <a:avLst/>
+          </a:prstGeom>
+          <a:solidFill>
+            <a:schemeClr val="accent2">
+              <a:alpha val="50000"/>
+            </a:schemeClr>
+          </a:solidFill>
+          <a:ln>
+            <a:noFill/>
+          </a:ln>
+        </p:spPr>
+        <p:style>
+          <a:lnRef idx="0">
+            <a:scrgbClr r="0" g="0" b="0"/>
+          </a:lnRef>
+          <a:fillRef idx="0">
+            <a:scrgbClr r="0" g="0" b="0"/>
+          </a:fillRef>
+          <a:effectRef idx="0">
+            <a:scrgbClr r="0" g="0" b="0"/>
+          </a:effectRef>
+          <a:fontRef idx="minor">
+            <a:schemeClr val="lt1"/>
+          </a:fontRef>
+        </p:style>
+        <p:txBody>
+          <a:bodyPr rtlCol="0" anchor="ctr"/>
+          <a:lstStyle/>
+          <a:p>
+            <a:pPr algn="ctr"/>
+            <a:endParaRPr lang="en-US"/>
+          </a:p>
+        </p:txBody>
+      </p:sp>
+      <p:sp>
+        <p:nvSpPr>
+          <p:cNvPr id="6" name="Right Arrow 5"/>
+          <p:cNvSpPr/>
+          <p:nvPr/>
+        </p:nvSpPr>
+        <p:spPr>
+          <a:xfrm rot="10800000">
+            <a:off x="5937374" y="3875335"/>
+            <a:ext cx="894944" cy="223736"/>
+          </a:xfrm>
+          <a:prstGeom prst="rightArrow">
+            <a:avLst/>
+          </a:prstGeom>
+          <a:solidFill>
+            <a:schemeClr val="accent2">
+              <a:alpha val="50000"/>
+            </a:schemeClr>
+          </a:solidFill>
+          <a:ln>
+            <a:noFill/>
+          </a:ln>
+        </p:spPr>
+        <p:style>
+          <a:lnRef idx="0">
+            <a:scrgbClr r="0" g="0" b="0"/>
+          </a:lnRef>
+          <a:fillRef idx="0">
+            <a:scrgbClr r="0" g="0" b="0"/>
+          </a:fillRef>
+          <a:effectRef idx="0">
+            <a:scrgbClr r="0" g="0" b="0"/>
+          </a:effectRef>
+          <a:fontRef idx="minor">
+            <a:schemeClr val="lt1"/>
+          </a:fontRef>
+        </p:style>
+        <p:txBody>
+          <a:bodyPr rtlCol="0" anchor="ctr"/>
+          <a:lstStyle/>
+          <a:p>
+            <a:pPr algn="ctr"/>
+            <a:endParaRPr lang="en-US"/>
+          </a:p>
+        </p:txBody>
+      </p:sp>
+      <p:sp>
+        <p:nvSpPr>
+          <p:cNvPr id="7" name="TextBox 6"/>
+          <p:cNvSpPr txBox="1"/>
+          <p:nvPr/>
+        </p:nvSpPr>
+        <p:spPr>
+          <a:xfrm>
+            <a:off x="2961878" y="3431132"/>
+            <a:ext cx="3017173" cy="400110"/>
+          </a:xfrm>
+          <a:prstGeom prst="rect">
+            <a:avLst/>
+          </a:prstGeom>
+          <a:noFill/>
+        </p:spPr>
+        <p:txBody>
+          <a:bodyPr wrap="none" rtlCol="0">
+            <a:spAutoFit/>
+          </a:bodyPr>
+          <a:lstStyle/>
+          <a:p>
+            <a:r>
+              <a:rPr lang="fa-IR" sz="2000" dirty="0" smtClean="0">
+                <a:cs typeface="B Nazanin" panose="00000400000000000000" pitchFamily="2" charset="-78"/>
+              </a:rPr>
+              <a:t>مکان </a:t>
+            </a:r>
+            <a:r>
+              <a:rPr lang="fa-IR" sz="2000" dirty="0">
+                <a:cs typeface="B Nazanin" panose="00000400000000000000" pitchFamily="2" charset="-78"/>
+              </a:rPr>
+              <a:t>هر کاراکتر را مشخص می </a:t>
+            </a:r>
+            <a:r>
+              <a:rPr lang="fa-IR" sz="2000" dirty="0" smtClean="0">
+                <a:cs typeface="B Nazanin" panose="00000400000000000000" pitchFamily="2" charset="-78"/>
+              </a:rPr>
+              <a:t>کند.</a:t>
+            </a:r>
+            <a:endParaRPr lang="en-US" sz="2000" dirty="0"/>
+          </a:p>
+        </p:txBody>
+      </p:sp>
+      <p:sp>
+        <p:nvSpPr>
+          <p:cNvPr id="12" name="TextBox 11"/>
+          <p:cNvSpPr txBox="1"/>
+          <p:nvPr/>
+        </p:nvSpPr>
+        <p:spPr>
+          <a:xfrm>
+            <a:off x="2379989" y="3787148"/>
+            <a:ext cx="3557384" cy="400110"/>
+          </a:xfrm>
+          <a:prstGeom prst="rect">
+            <a:avLst/>
+          </a:prstGeom>
+          <a:noFill/>
+        </p:spPr>
+        <p:txBody>
+          <a:bodyPr wrap="none" rtlCol="0">
+            <a:spAutoFit/>
+          </a:bodyPr>
+          <a:lstStyle/>
+          <a:p>
+            <a:r>
+              <a:rPr lang="fa-IR" sz="2000" dirty="0" smtClean="0">
+                <a:cs typeface="B Nazanin" panose="00000400000000000000" pitchFamily="2" charset="-78"/>
+              </a:rPr>
+              <a:t>برای </a:t>
+            </a:r>
+            <a:r>
+              <a:rPr lang="fa-IR" sz="2000" dirty="0">
+                <a:cs typeface="B Nazanin" panose="00000400000000000000" pitchFamily="2" charset="-78"/>
+              </a:rPr>
+              <a:t>گروه </a:t>
+            </a:r>
+            <a:r>
+              <a:rPr lang="fa-IR" sz="2000" dirty="0" smtClean="0">
+                <a:cs typeface="B Nazanin" panose="00000400000000000000" pitchFamily="2" charset="-78"/>
+              </a:rPr>
+              <a:t>بندی کاراکترها استفاده می شوند</a:t>
+            </a:r>
+            <a:endParaRPr lang="en-US" sz="2000" dirty="0"/>
+          </a:p>
+        </p:txBody>
+      </p:sp>
+    </p:spTree>
+    <p:extLst>
+      <p:ext uri="{BB962C8B-B14F-4D97-AF65-F5344CB8AC3E}">
+        <p14:creationId xmlns:p14="http://schemas.microsoft.com/office/powerpoint/2010/main" val="2891467218"/>
+      </p:ext>
+    </p:extLst>
+  </p:cSld>
+  <p:clrMapOvr>
+    <a:masterClrMapping/>
+  </p:clrMapOvr>
+  <p:timing>
+    <p:tnLst>
+      <p:par>
+        <p:cTn id="1" dur="indefinite" restart="never" nodeType="tmRoot">
+          <p:childTnLst>
+            <p:seq concurrent="1" nextAc="seek">
+              <p:cTn id="2" dur="indefinite" nodeType="mainSeq">
+                <p:childTnLst>
+                  <p:par>
+                    <p:cTn id="3" fill="hold">
+                      <p:stCondLst>
+                        <p:cond delay="indefinite"/>
+                      </p:stCondLst>
+                      <p:childTnLst>
+                        <p:par>
+                          <p:cTn id="4" fill="hold">
+                            <p:stCondLst>
+                              <p:cond delay="0"/>
+                            </p:stCondLst>
+                            <p:childTnLst>
+                              <p:par>
+                                <p:cTn id="5" presetID="10" presetClass="entr" presetSubtype="0" fill="hold" nodeType="clickEffect">
+                                  <p:stCondLst>
+                                    <p:cond delay="0"/>
+                                  </p:stCondLst>
+                                  <p:childTnLst>
+                                    <p:set>
+                                      <p:cBhvr>
+                                        <p:cTn id="6" dur="1" fill="hold">
+                                          <p:stCondLst>
+                                            <p:cond delay="0"/>
+                                          </p:stCondLst>
+                                        </p:cTn>
+                                        <p:tgtEl>
+                                          <p:spTgt spid="3">
+                                            <p:txEl>
+                                              <p:pRg st="0" end="0"/>
+                                            </p:txEl>
+                                          </p:spTgt>
+                                        </p:tgtEl>
+                                        <p:attrNameLst>
+                                          <p:attrName>style.visibility</p:attrName>
+                                        </p:attrNameLst>
+                                      </p:cBhvr>
+                                      <p:to>
+                                        <p:strVal val="visible"/>
+                                      </p:to>
+                                    </p:set>
+                                    <p:animEffect transition="in" filter="fade">
+                                      <p:cBhvr>
+                                        <p:cTn id="7" dur="500"/>
+                                        <p:tgtEl>
+                                          <p:spTgt spid="3">
+                                            <p:txEl>
+                                              <p:pRg st="0" end="0"/>
+                                            </p:txEl>
+                                          </p:spTgt>
+                                        </p:tgtEl>
+                                      </p:cBhvr>
+                                    </p:animEffect>
+                                  </p:childTnLst>
+                                </p:cTn>
+                              </p:par>
+                            </p:childTnLst>
+                          </p:cTn>
+                        </p:par>
+                      </p:childTnLst>
+                    </p:cTn>
+                  </p:par>
+                  <p:par>
+                    <p:cTn id="8" fill="hold">
+                      <p:stCondLst>
+                        <p:cond delay="indefinite"/>
+                      </p:stCondLst>
+                      <p:childTnLst>
+                        <p:par>
+                          <p:cTn id="9" fill="hold">
+                            <p:stCondLst>
+                              <p:cond delay="0"/>
+                            </p:stCondLst>
+                            <p:childTnLst>
+                              <p:par>
+                                <p:cTn id="10" presetID="10" presetClass="entr" presetSubtype="0" fill="hold" nodeType="clickEffect">
+                                  <p:stCondLst>
+                                    <p:cond delay="0"/>
+                                  </p:stCondLst>
+                                  <p:childTnLst>
+                                    <p:set>
+                                      <p:cBhvr>
+                                        <p:cTn id="11" dur="1" fill="hold">
+                                          <p:stCondLst>
+                                            <p:cond delay="0"/>
+                                          </p:stCondLst>
+                                        </p:cTn>
+                                        <p:tgtEl>
+                                          <p:spTgt spid="3">
+                                            <p:txEl>
+                                              <p:pRg st="1" end="1"/>
+                                            </p:txEl>
+                                          </p:spTgt>
+                                        </p:tgtEl>
+                                        <p:attrNameLst>
+                                          <p:attrName>style.visibility</p:attrName>
+                                        </p:attrNameLst>
+                                      </p:cBhvr>
+                                      <p:to>
+                                        <p:strVal val="visible"/>
+                                      </p:to>
+                                    </p:set>
+                                    <p:animEffect transition="in" filter="fade">
+                                      <p:cBhvr>
+                                        <p:cTn id="12" dur="500"/>
+                                        <p:tgtEl>
+                                          <p:spTgt spid="3">
+                                            <p:txEl>
+                                              <p:pRg st="1" end="1"/>
+                                            </p:txEl>
+                                          </p:spTgt>
+                                        </p:tgtEl>
+                                      </p:cBhvr>
+                                    </p:animEffect>
+                                  </p:childTnLst>
+                                </p:cTn>
+                              </p:par>
+                            </p:childTnLst>
+                          </p:cTn>
+                        </p:par>
+                      </p:childTnLst>
+                    </p:cTn>
+                  </p:par>
+                  <p:par>
+                    <p:cTn id="13" fill="hold">
+                      <p:stCondLst>
+                        <p:cond delay="indefinite"/>
+                      </p:stCondLst>
+                      <p:childTnLst>
+                        <p:par>
+                          <p:cTn id="14" fill="hold">
+                            <p:stCondLst>
+                              <p:cond delay="0"/>
+                            </p:stCondLst>
+                            <p:childTnLst>
+                              <p:par>
+                                <p:cTn id="15" presetID="10" presetClass="entr" presetSubtype="0" fill="hold" nodeType="clickEffect">
+                                  <p:stCondLst>
+                                    <p:cond delay="0"/>
+                                  </p:stCondLst>
+                                  <p:childTnLst>
+                                    <p:set>
+                                      <p:cBhvr>
+                                        <p:cTn id="16" dur="1" fill="hold">
+                                          <p:stCondLst>
+                                            <p:cond delay="0"/>
+                                          </p:stCondLst>
+                                        </p:cTn>
+                                        <p:tgtEl>
+                                          <p:spTgt spid="3">
+                                            <p:txEl>
+                                              <p:pRg st="2" end="2"/>
+                                            </p:txEl>
+                                          </p:spTgt>
+                                        </p:tgtEl>
+                                        <p:attrNameLst>
+                                          <p:attrName>style.visibility</p:attrName>
+                                        </p:attrNameLst>
+                                      </p:cBhvr>
+                                      <p:to>
+                                        <p:strVal val="visible"/>
+                                      </p:to>
+                                    </p:set>
+                                    <p:animEffect transition="in" filter="fade">
+                                      <p:cBhvr>
+                                        <p:cTn id="17" dur="500"/>
+                                        <p:tgtEl>
+                                          <p:spTgt spid="3">
+                                            <p:txEl>
+                                              <p:pRg st="2" end="2"/>
+                                            </p:txEl>
+                                          </p:spTgt>
+                                        </p:tgtEl>
+                                      </p:cBhvr>
+                                    </p:animEffect>
+                                  </p:childTnLst>
+                                </p:cTn>
+                              </p:par>
+                            </p:childTnLst>
+                          </p:cTn>
+                        </p:par>
+                      </p:childTnLst>
+                    </p:cTn>
+                  </p:par>
+                  <p:par>
+                    <p:cTn id="18" fill="hold">
+                      <p:stCondLst>
+                        <p:cond delay="indefinite"/>
+                      </p:stCondLst>
+                      <p:childTnLst>
+                        <p:par>
+                          <p:cTn id="19" fill="hold">
+                            <p:stCondLst>
+                              <p:cond delay="0"/>
+                            </p:stCondLst>
+                            <p:childTnLst>
+                              <p:par>
+                                <p:cTn id="20" presetID="10" presetClass="entr" presetSubtype="0" fill="hold" nodeType="clickEffect">
+                                  <p:stCondLst>
+                                    <p:cond delay="0"/>
+                                  </p:stCondLst>
+                                  <p:childTnLst>
+                                    <p:set>
+                                      <p:cBhvr>
+                                        <p:cTn id="21" dur="1" fill="hold">
+                                          <p:stCondLst>
+                                            <p:cond delay="0"/>
+                                          </p:stCondLst>
+                                        </p:cTn>
+                                        <p:tgtEl>
+                                          <p:spTgt spid="3">
+                                            <p:txEl>
+                                              <p:pRg st="3" end="3"/>
+                                            </p:txEl>
+                                          </p:spTgt>
+                                        </p:tgtEl>
+                                        <p:attrNameLst>
+                                          <p:attrName>style.visibility</p:attrName>
+                                        </p:attrNameLst>
+                                      </p:cBhvr>
+                                      <p:to>
+                                        <p:strVal val="visible"/>
+                                      </p:to>
+                                    </p:set>
+                                    <p:animEffect transition="in" filter="fade">
+                                      <p:cBhvr>
+                                        <p:cTn id="22" dur="500"/>
+                                        <p:tgtEl>
+                                          <p:spTgt spid="3">
+                                            <p:txEl>
+                                              <p:pRg st="3" end="3"/>
+                                            </p:txEl>
+                                          </p:spTgt>
+                                        </p:tgtEl>
+                                      </p:cBhvr>
+                                    </p:animEffect>
+                                  </p:childTnLst>
+                                </p:cTn>
+                              </p:par>
+                            </p:childTnLst>
+                          </p:cTn>
+                        </p:par>
+                      </p:childTnLst>
+                    </p:cTn>
+                  </p:par>
+                  <p:par>
+                    <p:cTn id="23" fill="hold">
+                      <p:stCondLst>
+                        <p:cond delay="indefinite"/>
+                      </p:stCondLst>
+                      <p:childTnLst>
+                        <p:par>
+                          <p:cTn id="24" fill="hold">
+                            <p:stCondLst>
+                              <p:cond delay="0"/>
+                            </p:stCondLst>
+                            <p:childTnLst>
+                              <p:par>
+                                <p:cTn id="25" presetID="10" presetClass="entr" presetSubtype="0" fill="hold" nodeType="clickEffect">
+                                  <p:stCondLst>
+                                    <p:cond delay="0"/>
+                                  </p:stCondLst>
+                                  <p:childTnLst>
+                                    <p:set>
+                                      <p:cBhvr>
+                                        <p:cTn id="26" dur="1" fill="hold">
+                                          <p:stCondLst>
+                                            <p:cond delay="0"/>
+                                          </p:stCondLst>
+                                        </p:cTn>
+                                        <p:tgtEl>
+                                          <p:spTgt spid="3">
+                                            <p:txEl>
+                                              <p:pRg st="4" end="4"/>
+                                            </p:txEl>
+                                          </p:spTgt>
+                                        </p:tgtEl>
+                                        <p:attrNameLst>
+                                          <p:attrName>style.visibility</p:attrName>
+                                        </p:attrNameLst>
+                                      </p:cBhvr>
+                                      <p:to>
+                                        <p:strVal val="visible"/>
+                                      </p:to>
+                                    </p:set>
+                                    <p:animEffect transition="in" filter="fade">
+                                      <p:cBhvr>
+                                        <p:cTn id="27" dur="500"/>
+                                        <p:tgtEl>
+                                          <p:spTgt spid="3">
+                                            <p:txEl>
+                                              <p:pRg st="4" end="4"/>
+                                            </p:txEl>
+                                          </p:spTgt>
+                                        </p:tgtEl>
+                                      </p:cBhvr>
+                                    </p:animEffect>
+                                  </p:childTnLst>
+                                </p:cTn>
+                              </p:par>
+                            </p:childTnLst>
+                          </p:cTn>
+                        </p:par>
+                      </p:childTnLst>
+                    </p:cTn>
+                  </p:par>
+                  <p:par>
+                    <p:cTn id="28" fill="hold">
+                      <p:stCondLst>
+                        <p:cond delay="indefinite"/>
+                      </p:stCondLst>
+                      <p:childTnLst>
+                        <p:par>
+                          <p:cTn id="29" fill="hold">
+                            <p:stCondLst>
+                              <p:cond delay="0"/>
+                            </p:stCondLst>
+                            <p:childTnLst>
+                              <p:par>
+                                <p:cTn id="30" presetID="10" presetClass="entr" presetSubtype="0" fill="hold" grpId="0" nodeType="clickEffect">
+                                  <p:stCondLst>
+                                    <p:cond delay="0"/>
+                                  </p:stCondLst>
+                                  <p:childTnLst>
+                                    <p:set>
+                                      <p:cBhvr>
+                                        <p:cTn id="31" dur="1" fill="hold">
+                                          <p:stCondLst>
+                                            <p:cond delay="0"/>
+                                          </p:stCondLst>
+                                        </p:cTn>
+                                        <p:tgtEl>
+                                          <p:spTgt spid="5"/>
+                                        </p:tgtEl>
+                                        <p:attrNameLst>
+                                          <p:attrName>style.visibility</p:attrName>
+                                        </p:attrNameLst>
+                                      </p:cBhvr>
+                                      <p:to>
+                                        <p:strVal val="visible"/>
+                                      </p:to>
+                                    </p:set>
+                                    <p:animEffect transition="in" filter="fade">
+                                      <p:cBhvr>
+                                        <p:cTn id="32" dur="500"/>
+                                        <p:tgtEl>
+                                          <p:spTgt spid="5"/>
+                                        </p:tgtEl>
+                                      </p:cBhvr>
+                                    </p:animEffect>
+                                  </p:childTnLst>
+                                </p:cTn>
+                              </p:par>
+                            </p:childTnLst>
+                          </p:cTn>
+                        </p:par>
+                      </p:childTnLst>
+                    </p:cTn>
+                  </p:par>
+                  <p:par>
+                    <p:cTn id="33" fill="hold">
+                      <p:stCondLst>
+                        <p:cond delay="indefinite"/>
+                      </p:stCondLst>
+                      <p:childTnLst>
+                        <p:par>
+                          <p:cTn id="34" fill="hold">
+                            <p:stCondLst>
+                              <p:cond delay="0"/>
+                            </p:stCondLst>
+                            <p:childTnLst>
+                              <p:par>
+                                <p:cTn id="35" presetID="10" presetClass="entr" presetSubtype="0" fill="hold" grpId="0" nodeType="clickEffect">
+                                  <p:stCondLst>
+                                    <p:cond delay="0"/>
+                                  </p:stCondLst>
+                                  <p:childTnLst>
+                                    <p:set>
+                                      <p:cBhvr>
+                                        <p:cTn id="36" dur="1" fill="hold">
+                                          <p:stCondLst>
+                                            <p:cond delay="0"/>
+                                          </p:stCondLst>
+                                        </p:cTn>
+                                        <p:tgtEl>
+                                          <p:spTgt spid="7"/>
+                                        </p:tgtEl>
+                                        <p:attrNameLst>
+                                          <p:attrName>style.visibility</p:attrName>
+                                        </p:attrNameLst>
+                                      </p:cBhvr>
+                                      <p:to>
+                                        <p:strVal val="visible"/>
+                                      </p:to>
+                                    </p:set>
+                                    <p:animEffect transition="in" filter="fade">
+                                      <p:cBhvr>
+                                        <p:cTn id="37" dur="500"/>
+                                        <p:tgtEl>
+                                          <p:spTgt spid="7"/>
+                                        </p:tgtEl>
+                                      </p:cBhvr>
+                                    </p:animEffect>
+                                  </p:childTnLst>
+                                </p:cTn>
+                              </p:par>
+                            </p:childTnLst>
+                          </p:cTn>
+                        </p:par>
+                      </p:childTnLst>
+                    </p:cTn>
+                  </p:par>
+                  <p:par>
+                    <p:cTn id="38" fill="hold">
+                      <p:stCondLst>
+                        <p:cond delay="indefinite"/>
+                      </p:stCondLst>
+                      <p:childTnLst>
+                        <p:par>
+                          <p:cTn id="39" fill="hold">
+                            <p:stCondLst>
+                              <p:cond delay="0"/>
+                            </p:stCondLst>
+                            <p:childTnLst>
+                              <p:par>
+                                <p:cTn id="40" presetID="10" presetClass="entr" presetSubtype="0" fill="hold" grpId="0" nodeType="clickEffect">
+                                  <p:stCondLst>
+                                    <p:cond delay="0"/>
+                                  </p:stCondLst>
+                                  <p:childTnLst>
+                                    <p:set>
+                                      <p:cBhvr>
+                                        <p:cTn id="41" dur="1" fill="hold">
+                                          <p:stCondLst>
+                                            <p:cond delay="0"/>
+                                          </p:stCondLst>
+                                        </p:cTn>
+                                        <p:tgtEl>
+                                          <p:spTgt spid="6"/>
+                                        </p:tgtEl>
+                                        <p:attrNameLst>
+                                          <p:attrName>style.visibility</p:attrName>
+                                        </p:attrNameLst>
+                                      </p:cBhvr>
+                                      <p:to>
+                                        <p:strVal val="visible"/>
+                                      </p:to>
+                                    </p:set>
+                                    <p:animEffect transition="in" filter="fade">
+                                      <p:cBhvr>
+                                        <p:cTn id="42" dur="500"/>
+                                        <p:tgtEl>
+                                          <p:spTgt spid="6"/>
+                                        </p:tgtEl>
+                                      </p:cBhvr>
+                                    </p:animEffect>
+                                  </p:childTnLst>
+                                </p:cTn>
+                              </p:par>
+                            </p:childTnLst>
+                          </p:cTn>
+                        </p:par>
+                      </p:childTnLst>
+                    </p:cTn>
+                  </p:par>
+                  <p:par>
+                    <p:cTn id="43" fill="hold">
+                      <p:stCondLst>
+                        <p:cond delay="indefinite"/>
+                      </p:stCondLst>
+                      <p:childTnLst>
+                        <p:par>
+                          <p:cTn id="44" fill="hold">
+                            <p:stCondLst>
+                              <p:cond delay="0"/>
+                            </p:stCondLst>
+                            <p:childTnLst>
+                              <p:par>
+                                <p:cTn id="45" presetID="10" presetClass="entr" presetSubtype="0" fill="hold" grpId="0" nodeType="clickEffect">
+                                  <p:stCondLst>
+                                    <p:cond delay="0"/>
+                                  </p:stCondLst>
+                                  <p:childTnLst>
+                                    <p:set>
+                                      <p:cBhvr>
+                                        <p:cTn id="46" dur="1" fill="hold">
+                                          <p:stCondLst>
+                                            <p:cond delay="0"/>
+                                          </p:stCondLst>
+                                        </p:cTn>
+                                        <p:tgtEl>
+                                          <p:spTgt spid="12"/>
+                                        </p:tgtEl>
+                                        <p:attrNameLst>
+                                          <p:attrName>style.visibility</p:attrName>
+                                        </p:attrNameLst>
+                                      </p:cBhvr>
+                                      <p:to>
+                                        <p:strVal val="visible"/>
+                                      </p:to>
+                                    </p:set>
+                                    <p:animEffect transition="in" filter="fade">
+                                      <p:cBhvr>
+                                        <p:cTn id="47" dur="500"/>
+                                        <p:tgtEl>
+                                          <p:spTgt spid="12"/>
+                                        </p:tgtEl>
+                                      </p:cBhvr>
+                                    </p:animEffect>
+                                  </p:childTnLst>
+                                </p:cTn>
+                              </p:par>
+                            </p:childTnLst>
+                          </p:cTn>
+                        </p:par>
+                      </p:childTnLst>
+                    </p:cTn>
+                  </p:par>
+                  <p:par>
+                    <p:cTn id="48" fill="hold">
+                      <p:stCondLst>
+                        <p:cond delay="indefinite"/>
+                      </p:stCondLst>
+                      <p:childTnLst>
+                        <p:par>
+                          <p:cTn id="49" fill="hold">
+                            <p:stCondLst>
+                              <p:cond delay="0"/>
+                            </p:stCondLst>
+                            <p:childTnLst>
+                              <p:par>
+                                <p:cTn id="50" presetID="10" presetClass="entr" presetSubtype="0" fill="hold" nodeType="clickEffect">
+                                  <p:stCondLst>
+                                    <p:cond delay="0"/>
+                                  </p:stCondLst>
+                                  <p:childTnLst>
+                                    <p:set>
+                                      <p:cBhvr>
+                                        <p:cTn id="51" dur="1" fill="hold">
+                                          <p:stCondLst>
+                                            <p:cond delay="0"/>
+                                          </p:stCondLst>
+                                        </p:cTn>
+                                        <p:tgtEl>
+                                          <p:spTgt spid="3">
+                                            <p:txEl>
+                                              <p:pRg st="6" end="6"/>
+                                            </p:txEl>
+                                          </p:spTgt>
+                                        </p:tgtEl>
+                                        <p:attrNameLst>
+                                          <p:attrName>style.visibility</p:attrName>
+                                        </p:attrNameLst>
+                                      </p:cBhvr>
+                                      <p:to>
+                                        <p:strVal val="visible"/>
+                                      </p:to>
+                                    </p:set>
+                                    <p:animEffect transition="in" filter="fade">
+                                      <p:cBhvr>
+                                        <p:cTn id="52" dur="500"/>
+                                        <p:tgtEl>
+                                          <p:spTgt spid="3">
+                                            <p:txEl>
+                                              <p:pRg st="6" end="6"/>
+                                            </p:txEl>
+                                          </p:spTgt>
+                                        </p:tgtEl>
+                                      </p:cBhvr>
+                                    </p:animEffect>
+                                  </p:childTnLst>
+                                </p:cTn>
+                              </p:par>
+                            </p:childTnLst>
+                          </p:cTn>
+                        </p:par>
+                      </p:childTnLst>
+                    </p:cTn>
+                  </p:par>
+                </p:childTnLst>
+              </p:cTn>
+              <p:prevCondLst>
+                <p:cond evt="onPrev" delay="0">
+                  <p:tgtEl>
+                    <p:sldTgt/>
+                  </p:tgtEl>
+                </p:cond>
+              </p:prevCondLst>
+              <p:nextCondLst>
+                <p:cond evt="onNext" delay="0">
+                  <p:tgtEl>
+                    <p:sldTgt/>
+                  </p:tgtEl>
+                </p:cond>
+              </p:nextCondLst>
+            </p:seq>
+          </p:childTnLst>
+        </p:cTn>
+      </p:par>
+    </p:tnLst>
+    <p:bldLst>
+      <p:bldP spid="5" grpId="0" animBg="1"/>
+      <p:bldP spid="6" grpId="0" animBg="1"/>
+      <p:bldP spid="7" grpId="0"/>
+      <p:bldP spid="12" grpId="0"/>
+    </p:bldLst>
+  </p:timing>
+</p:sld>
+</file>
+
+<file path=ppt/slides/slide25.xml><?xml version="1.0" encoding="utf-8"?>
+<p:sld xmlns:a="http://schemas.openxmlformats.org/drawingml/2006/main" xmlns:r="http://schemas.openxmlformats.org/officeDocument/2006/relationships" xmlns:p="http://schemas.openxmlformats.org/presentationml/2006/main">
+  <p:cSld>
+    <p:spTree>
+      <p:nvGrpSpPr>
+        <p:cNvPr id="1" name=""/>
+        <p:cNvGrpSpPr/>
+        <p:nvPr/>
+      </p:nvGrpSpPr>
+      <p:grpSpPr>
+        <a:xfrm>
+          <a:off x="0" y="0"/>
+          <a:ext cx="0" cy="0"/>
+          <a:chOff x="0" y="0"/>
+          <a:chExt cx="0" cy="0"/>
+        </a:xfrm>
+      </p:grpSpPr>
+      <p:sp>
+        <p:nvSpPr>
+          <p:cNvPr id="2" name="Title 1"/>
+          <p:cNvSpPr>
+            <a:spLocks noGrp="1"/>
+          </p:cNvSpPr>
+          <p:nvPr>
+            <p:ph type="title"/>
+          </p:nvPr>
+        </p:nvSpPr>
+        <p:spPr/>
+        <p:txBody>
+          <a:bodyPr/>
+          <a:lstStyle/>
+          <a:p>
+            <a:pPr algn="r" rtl="1"/>
+            <a:r>
+              <a:rPr lang="fa-IR" dirty="0" smtClean="0">
+                <a:cs typeface="B Nazanin" panose="00000400000000000000" pitchFamily="2" charset="-78"/>
+              </a:rPr>
+              <a:t>معماری</a:t>
+            </a:r>
+            <a:endParaRPr lang="en-US" dirty="0">
+              <a:cs typeface="B Nazanin" panose="00000400000000000000" pitchFamily="2" charset="-78"/>
+            </a:endParaRPr>
+          </a:p>
+        </p:txBody>
+      </p:sp>
+      <p:sp>
+        <p:nvSpPr>
+          <p:cNvPr id="3" name="Content Placeholder 2"/>
+          <p:cNvSpPr>
+            <a:spLocks noGrp="1"/>
+          </p:cNvSpPr>
+          <p:nvPr>
+            <p:ph idx="1"/>
+          </p:nvPr>
+        </p:nvSpPr>
+        <p:spPr/>
+        <p:txBody>
+          <a:bodyPr>
+            <a:normAutofit/>
+          </a:bodyPr>
+          <a:lstStyle/>
+          <a:p>
+            <a:pPr algn="just" rtl="1">
+              <a:lnSpc>
+                <a:spcPct val="200000"/>
+              </a:lnSpc>
+              <a:buFont typeface="Wingdings" panose="05000000000000000000" pitchFamily="2" charset="2"/>
+              <a:buChar char="Ø"/>
+            </a:pPr>
+            <a:r>
+              <a:rPr lang="fa-IR" sz="2400" dirty="0">
+                <a:cs typeface="B Nazanin" panose="00000400000000000000" pitchFamily="2" charset="-78"/>
+              </a:rPr>
+              <a:t>شبکه پایه این روش، یک شبکه </a:t>
+            </a:r>
+            <a:r>
+              <a:rPr lang="fa-IR" sz="2400" b="1" dirty="0">
+                <a:cs typeface="B Nazanin" panose="00000400000000000000" pitchFamily="2" charset="-78"/>
+              </a:rPr>
+              <a:t>کاملا کانوولوشنی </a:t>
+            </a:r>
+            <a:r>
+              <a:rPr lang="fa-IR" sz="2400" dirty="0">
+                <a:cs typeface="B Nazanin" panose="00000400000000000000" pitchFamily="2" charset="-78"/>
+              </a:rPr>
+              <a:t>بر اساس</a:t>
+            </a:r>
+            <a:r>
+              <a:rPr lang="fa-IR" sz="2400" b="1" dirty="0">
+                <a:cs typeface="B Nazanin" panose="00000400000000000000" pitchFamily="2" charset="-78"/>
+              </a:rPr>
+              <a:t> </a:t>
+            </a:r>
+            <a:r>
+              <a:rPr lang="en-US" sz="2400" b="1" dirty="0">
+                <a:cs typeface="B Nazanin" panose="00000400000000000000" pitchFamily="2" charset="-78"/>
+              </a:rPr>
+              <a:t>VGG-16</a:t>
+            </a:r>
+            <a:r>
+              <a:rPr lang="fa-IR" sz="2400" dirty="0">
+                <a:cs typeface="B Nazanin" panose="00000400000000000000" pitchFamily="2" charset="-78"/>
+              </a:rPr>
+              <a:t> می باشد</a:t>
+            </a:r>
+            <a:r>
+              <a:rPr lang="fa-IR" sz="2400" dirty="0" smtClean="0">
+                <a:cs typeface="B Nazanin" panose="00000400000000000000" pitchFamily="2" charset="-78"/>
+              </a:rPr>
+              <a:t>.</a:t>
+            </a:r>
+          </a:p>
+          <a:p>
+            <a:pPr algn="just" rtl="1">
+              <a:lnSpc>
+                <a:spcPct val="200000"/>
+              </a:lnSpc>
+              <a:buFont typeface="Wingdings" panose="05000000000000000000" pitchFamily="2" charset="2"/>
+              <a:buChar char="Ø"/>
+            </a:pPr>
+            <a:r>
+              <a:rPr lang="fa-IR" sz="2400" dirty="0" smtClean="0">
+                <a:cs typeface="B Nazanin" panose="00000400000000000000" pitchFamily="2" charset="-78"/>
+              </a:rPr>
+              <a:t> </a:t>
+            </a:r>
+            <a:r>
+              <a:rPr lang="fa-IR" sz="2400" dirty="0">
+                <a:cs typeface="B Nazanin" panose="00000400000000000000" pitchFamily="2" charset="-78"/>
+              </a:rPr>
+              <a:t>این شبکه دارای </a:t>
+            </a:r>
+            <a:r>
+              <a:rPr lang="en-US" sz="2400" b="1" dirty="0">
+                <a:cs typeface="B Nazanin" panose="00000400000000000000" pitchFamily="2" charset="-78"/>
+              </a:rPr>
+              <a:t>skip connection</a:t>
+            </a:r>
+            <a:r>
+              <a:rPr lang="fa-IR" sz="2400" b="1" dirty="0">
+                <a:cs typeface="B Nazanin" panose="00000400000000000000" pitchFamily="2" charset="-78"/>
+              </a:rPr>
+              <a:t> </a:t>
+            </a:r>
+            <a:r>
+              <a:rPr lang="fa-IR" sz="2400" dirty="0">
+                <a:cs typeface="B Nazanin" panose="00000400000000000000" pitchFamily="2" charset="-78"/>
+              </a:rPr>
+              <a:t>در قسمت </a:t>
+            </a:r>
+            <a:r>
+              <a:rPr lang="en-US" sz="2400" dirty="0">
+                <a:cs typeface="B Nazanin" panose="00000400000000000000" pitchFamily="2" charset="-78"/>
+              </a:rPr>
+              <a:t>decoding</a:t>
+            </a:r>
+            <a:r>
+              <a:rPr lang="fa-IR" sz="2400" dirty="0">
+                <a:cs typeface="B Nazanin" panose="00000400000000000000" pitchFamily="2" charset="-78"/>
+              </a:rPr>
+              <a:t> می باشد که شبیه شبکه </a:t>
+            </a:r>
+            <a:r>
+              <a:rPr lang="en-US" sz="2400" dirty="0">
+                <a:cs typeface="B Nazanin" panose="00000400000000000000" pitchFamily="2" charset="-78"/>
+              </a:rPr>
+              <a:t>U-Net</a:t>
+            </a:r>
+            <a:r>
+              <a:rPr lang="fa-IR" sz="2400" dirty="0">
+                <a:cs typeface="B Nazanin" panose="00000400000000000000" pitchFamily="2" charset="-78"/>
+              </a:rPr>
+              <a:t>، ویژگی های سطح پایین را نیز در نظر می گیرد. </a:t>
+            </a:r>
+            <a:endParaRPr lang="fa-IR" sz="2400" dirty="0" smtClean="0">
+              <a:cs typeface="B Nazanin" panose="00000400000000000000" pitchFamily="2" charset="-78"/>
+            </a:endParaRPr>
+          </a:p>
+          <a:p>
+            <a:pPr algn="just" rtl="1">
+              <a:lnSpc>
+                <a:spcPct val="200000"/>
+              </a:lnSpc>
+              <a:buFont typeface="Wingdings" panose="05000000000000000000" pitchFamily="2" charset="2"/>
+              <a:buChar char="Ø"/>
+            </a:pPr>
+            <a:r>
+              <a:rPr lang="fa-IR" sz="2400" dirty="0" smtClean="0">
+                <a:cs typeface="B Nazanin" panose="00000400000000000000" pitchFamily="2" charset="-78"/>
+              </a:rPr>
+              <a:t>خروجی </a:t>
+            </a:r>
+            <a:r>
+              <a:rPr lang="fa-IR" sz="2400" dirty="0">
+                <a:cs typeface="B Nazanin" panose="00000400000000000000" pitchFamily="2" charset="-78"/>
+              </a:rPr>
+              <a:t>این شبکه دارای دو کانال است که شامل دو امتیاز، </a:t>
+            </a:r>
+            <a:r>
+              <a:rPr lang="en-US" sz="2400" b="1" dirty="0">
+                <a:cs typeface="B Nazanin" panose="00000400000000000000" pitchFamily="2" charset="-78"/>
+              </a:rPr>
+              <a:t>region score</a:t>
+            </a:r>
+            <a:r>
+              <a:rPr lang="fa-IR" sz="2400" dirty="0">
+                <a:cs typeface="B Nazanin" panose="00000400000000000000" pitchFamily="2" charset="-78"/>
+              </a:rPr>
+              <a:t> و </a:t>
+            </a:r>
+            <a:r>
+              <a:rPr lang="en-US" sz="2400" b="1" dirty="0">
+                <a:cs typeface="B Nazanin" panose="00000400000000000000" pitchFamily="2" charset="-78"/>
+              </a:rPr>
+              <a:t>affinity score</a:t>
+            </a:r>
+            <a:r>
+              <a:rPr lang="fa-IR" sz="2400" b="1" dirty="0">
+                <a:cs typeface="B Nazanin" panose="00000400000000000000" pitchFamily="2" charset="-78"/>
+              </a:rPr>
+              <a:t> </a:t>
+            </a:r>
+            <a:r>
+              <a:rPr lang="fa-IR" sz="2400" dirty="0">
+                <a:cs typeface="B Nazanin" panose="00000400000000000000" pitchFamily="2" charset="-78"/>
+              </a:rPr>
+              <a:t>می باشد.</a:t>
+            </a:r>
+            <a:endParaRPr lang="en-US" sz="2400" dirty="0">
+              <a:cs typeface="B Nazanin" panose="00000400000000000000" pitchFamily="2" charset="-78"/>
+            </a:endParaRPr>
+          </a:p>
+          <a:p>
+            <a:pPr algn="just"/>
+            <a:endParaRPr lang="en-US" sz="2400" dirty="0">
+              <a:cs typeface="B Nazanin" panose="00000400000000000000" pitchFamily="2" charset="-78"/>
+            </a:endParaRPr>
+          </a:p>
+        </p:txBody>
+      </p:sp>
+      <p:sp>
+        <p:nvSpPr>
+          <p:cNvPr id="4" name="Slide Number Placeholder 3"/>
+          <p:cNvSpPr>
+            <a:spLocks noGrp="1"/>
+          </p:cNvSpPr>
+          <p:nvPr>
+            <p:ph type="sldNum" sz="quarter" idx="12"/>
+          </p:nvPr>
+        </p:nvSpPr>
+        <p:spPr/>
+        <p:txBody>
+          <a:bodyPr/>
+          <a:lstStyle/>
+          <a:p>
+            <a:fld id="{18087783-62FF-446C-A2E4-4C6B0B0DE16F}" type="slidenum">
+              <a:rPr lang="en-US" smtClean="0"/>
+              <a:t>25</a:t>
+            </a:fld>
+            <a:endParaRPr lang="en-US"/>
+          </a:p>
+        </p:txBody>
+      </p:sp>
+    </p:spTree>
+    <p:extLst>
+      <p:ext uri="{BB962C8B-B14F-4D97-AF65-F5344CB8AC3E}">
+        <p14:creationId xmlns:p14="http://schemas.microsoft.com/office/powerpoint/2010/main" val="4258239680"/>
+      </p:ext>
+    </p:extLst>
+  </p:cSld>
+  <p:clrMapOvr>
+    <a:masterClrMapping/>
+  </p:clrMapOvr>
+  <p:timing>
+    <p:tnLst>
+      <p:par>
+        <p:cTn id="1" dur="indefinite" restart="never" nodeType="tmRoot">
+          <p:childTnLst>
+            <p:seq concurrent="1" nextAc="seek">
+              <p:cTn id="2" dur="indefinite" nodeType="mainSeq">
+                <p:childTnLst>
+                  <p:par>
+                    <p:cTn id="3" fill="hold">
+                      <p:stCondLst>
+                        <p:cond delay="indefinite"/>
+                      </p:stCondLst>
+                      <p:childTnLst>
+                        <p:par>
+                          <p:cTn id="4" fill="hold">
+                            <p:stCondLst>
+                              <p:cond delay="0"/>
+                            </p:stCondLst>
+                            <p:childTnLst>
+                              <p:par>
+                                <p:cTn id="5" presetID="10" presetClass="entr" presetSubtype="0" fill="hold" nodeType="clickEffect">
+                                  <p:stCondLst>
+                                    <p:cond delay="0"/>
+                                  </p:stCondLst>
+                                  <p:childTnLst>
+                                    <p:set>
+                                      <p:cBhvr>
+                                        <p:cTn id="6" dur="1" fill="hold">
+                                          <p:stCondLst>
+                                            <p:cond delay="0"/>
+                                          </p:stCondLst>
+                                        </p:cTn>
+                                        <p:tgtEl>
+                                          <p:spTgt spid="3">
+                                            <p:txEl>
+                                              <p:pRg st="0" end="0"/>
+                                            </p:txEl>
+                                          </p:spTgt>
+                                        </p:tgtEl>
+                                        <p:attrNameLst>
+                                          <p:attrName>style.visibility</p:attrName>
+                                        </p:attrNameLst>
+                                      </p:cBhvr>
+                                      <p:to>
+                                        <p:strVal val="visible"/>
+                                      </p:to>
+                                    </p:set>
+                                    <p:animEffect transition="in" filter="fade">
+                                      <p:cBhvr>
+                                        <p:cTn id="7" dur="500"/>
+                                        <p:tgtEl>
+                                          <p:spTgt spid="3">
+                                            <p:txEl>
+                                              <p:pRg st="0" end="0"/>
+                                            </p:txEl>
+                                          </p:spTgt>
+                                        </p:tgtEl>
+                                      </p:cBhvr>
+                                    </p:animEffect>
+                                  </p:childTnLst>
+                                </p:cTn>
+                              </p:par>
+                            </p:childTnLst>
+                          </p:cTn>
+                        </p:par>
+                      </p:childTnLst>
+                    </p:cTn>
+                  </p:par>
+                  <p:par>
+                    <p:cTn id="8" fill="hold">
+                      <p:stCondLst>
+                        <p:cond delay="indefinite"/>
+                      </p:stCondLst>
+                      <p:childTnLst>
+                        <p:par>
+                          <p:cTn id="9" fill="hold">
+                            <p:stCondLst>
+                              <p:cond delay="0"/>
+                            </p:stCondLst>
+                            <p:childTnLst>
+                              <p:par>
+                                <p:cTn id="10" presetID="10" presetClass="entr" presetSubtype="0" fill="hold" nodeType="clickEffect">
+                                  <p:stCondLst>
+                                    <p:cond delay="0"/>
+                                  </p:stCondLst>
+                                  <p:childTnLst>
+                                    <p:set>
+                                      <p:cBhvr>
+                                        <p:cTn id="11" dur="1" fill="hold">
+                                          <p:stCondLst>
+                                            <p:cond delay="0"/>
+                                          </p:stCondLst>
+                                        </p:cTn>
+                                        <p:tgtEl>
+                                          <p:spTgt spid="3">
+                                            <p:txEl>
+                                              <p:pRg st="1" end="1"/>
+                                            </p:txEl>
+                                          </p:spTgt>
+                                        </p:tgtEl>
+                                        <p:attrNameLst>
+                                          <p:attrName>style.visibility</p:attrName>
+                                        </p:attrNameLst>
+                                      </p:cBhvr>
+                                      <p:to>
+                                        <p:strVal val="visible"/>
+                                      </p:to>
+                                    </p:set>
+                                    <p:animEffect transition="in" filter="fade">
+                                      <p:cBhvr>
+                                        <p:cTn id="12" dur="500"/>
+                                        <p:tgtEl>
+                                          <p:spTgt spid="3">
+                                            <p:txEl>
+                                              <p:pRg st="1" end="1"/>
+                                            </p:txEl>
+                                          </p:spTgt>
+                                        </p:tgtEl>
+                                      </p:cBhvr>
+                                    </p:animEffect>
+                                  </p:childTnLst>
+                                </p:cTn>
+                              </p:par>
+                            </p:childTnLst>
+                          </p:cTn>
+                        </p:par>
+                      </p:childTnLst>
+                    </p:cTn>
+                  </p:par>
+                  <p:par>
+                    <p:cTn id="13" fill="hold">
+                      <p:stCondLst>
+                        <p:cond delay="indefinite"/>
+                      </p:stCondLst>
+                      <p:childTnLst>
+                        <p:par>
+                          <p:cTn id="14" fill="hold">
+                            <p:stCondLst>
+                              <p:cond delay="0"/>
+                            </p:stCondLst>
+                            <p:childTnLst>
+                              <p:par>
+                                <p:cTn id="15" presetID="10" presetClass="entr" presetSubtype="0" fill="hold" nodeType="clickEffect">
+                                  <p:stCondLst>
+                                    <p:cond delay="0"/>
+                                  </p:stCondLst>
+                                  <p:childTnLst>
+                                    <p:set>
+                                      <p:cBhvr>
+                                        <p:cTn id="16" dur="1" fill="hold">
+                                          <p:stCondLst>
+                                            <p:cond delay="0"/>
+                                          </p:stCondLst>
+                                        </p:cTn>
+                                        <p:tgtEl>
+                                          <p:spTgt spid="3">
+                                            <p:txEl>
+                                              <p:pRg st="2" end="2"/>
+                                            </p:txEl>
+                                          </p:spTgt>
+                                        </p:tgtEl>
+                                        <p:attrNameLst>
+                                          <p:attrName>style.visibility</p:attrName>
+                                        </p:attrNameLst>
+                                      </p:cBhvr>
+                                      <p:to>
+                                        <p:strVal val="visible"/>
+                                      </p:to>
+                                    </p:set>
+                                    <p:animEffect transition="in" filter="fade">
+                                      <p:cBhvr>
+                                        <p:cTn id="17" dur="500"/>
+                                        <p:tgtEl>
+                                          <p:spTgt spid="3">
+                                            <p:txEl>
+                                              <p:pRg st="2" end="2"/>
+                                            </p:txEl>
+                                          </p:spTgt>
+                                        </p:tgtEl>
+                                      </p:cBhvr>
+                                    </p:animEffect>
+                                  </p:childTnLst>
+                                </p:cTn>
+                              </p:par>
+                            </p:childTnLst>
+                          </p:cTn>
+                        </p:par>
+                      </p:childTnLst>
+                    </p:cTn>
+                  </p:par>
+                </p:childTnLst>
+              </p:cTn>
+              <p:prevCondLst>
+                <p:cond evt="onPrev" delay="0">
+                  <p:tgtEl>
+                    <p:sldTgt/>
+                  </p:tgtEl>
+                </p:cond>
+              </p:prevCondLst>
+              <p:nextCondLst>
+                <p:cond evt="onNext" delay="0">
+                  <p:tgtEl>
+                    <p:sldTgt/>
+                  </p:tgtEl>
+                </p:cond>
+              </p:nextCondLst>
+            </p:seq>
+          </p:childTnLst>
+        </p:cTn>
+      </p:par>
+    </p:tnLst>
+  </p:timing>
+</p:sld>
+</file>
+
+<file path=ppt/slides/slide26.xml><?xml version="1.0" encoding="utf-8"?>
+<p:sld xmlns:a="http://schemas.openxmlformats.org/drawingml/2006/main" xmlns:r="http://schemas.openxmlformats.org/officeDocument/2006/relationships" xmlns:p="http://schemas.openxmlformats.org/presentationml/2006/main">
+  <p:cSld>
+    <p:spTree>
+      <p:nvGrpSpPr>
+        <p:cNvPr id="1" name=""/>
+        <p:cNvGrpSpPr/>
+        <p:nvPr/>
+      </p:nvGrpSpPr>
+      <p:grpSpPr>
+        <a:xfrm>
+          <a:off x="0" y="0"/>
+          <a:ext cx="0" cy="0"/>
+          <a:chOff x="0" y="0"/>
+          <a:chExt cx="0" cy="0"/>
+        </a:xfrm>
+      </p:grpSpPr>
+      <p:sp>
+        <p:nvSpPr>
+          <p:cNvPr id="2" name="Slide Number Placeholder 1"/>
+          <p:cNvSpPr>
+            <a:spLocks noGrp="1"/>
+          </p:cNvSpPr>
+          <p:nvPr>
+            <p:ph type="sldNum" sz="quarter" idx="12"/>
+          </p:nvPr>
+        </p:nvSpPr>
+        <p:spPr/>
+        <p:txBody>
+          <a:bodyPr/>
+          <a:lstStyle/>
+          <a:p>
+            <a:fld id="{18087783-62FF-446C-A2E4-4C6B0B0DE16F}" type="slidenum">
+              <a:rPr lang="en-US" smtClean="0"/>
+              <a:t>26</a:t>
+            </a:fld>
+            <a:endParaRPr lang="en-US"/>
+          </a:p>
+        </p:txBody>
+      </p:sp>
+      <p:pic>
+        <p:nvPicPr>
+          <p:cNvPr id="3" name="Content Placeholder 4"/>
+          <p:cNvPicPr>
+            <a:picLocks/>
+          </p:cNvPicPr>
+          <p:nvPr/>
+        </p:nvPicPr>
+        <p:blipFill>
+          <a:blip r:embed="rId2"/>
+          <a:stretch>
+            <a:fillRect/>
+          </a:stretch>
+        </p:blipFill>
+        <p:spPr>
+          <a:xfrm>
+            <a:off x="2826329" y="77930"/>
+            <a:ext cx="6255326" cy="6244936"/>
+          </a:xfrm>
+          <a:prstGeom prst="rect">
+            <a:avLst/>
+          </a:prstGeom>
+        </p:spPr>
+      </p:pic>
+    </p:spTree>
+    <p:extLst>
+      <p:ext uri="{BB962C8B-B14F-4D97-AF65-F5344CB8AC3E}">
+        <p14:creationId xmlns:p14="http://schemas.microsoft.com/office/powerpoint/2010/main" val="4268613976"/>
+      </p:ext>
+    </p:extLst>
+  </p:cSld>
+  <p:clrMapOvr>
+    <a:masterClrMapping/>
+  </p:clrMapOvr>
+  <p:timing>
+    <p:tnLst>
+      <p:par>
+        <p:cTn id="1" dur="indefinite" restart="never" nodeType="tmRoot">
+          <p:childTnLst>
+            <p:seq concurrent="1" nextAc="seek">
+              <p:cTn id="2" dur="indefinite" nodeType="mainSeq">
+                <p:childTnLst>
+                  <p:par>
+                    <p:cTn id="3" fill="hold">
+                      <p:stCondLst>
+                        <p:cond delay="indefinite"/>
+                      </p:stCondLst>
+                      <p:childTnLst>
+                        <p:par>
+                          <p:cTn id="4" fill="hold">
+                            <p:stCondLst>
+                              <p:cond delay="0"/>
+                            </p:stCondLst>
+                            <p:childTnLst>
+                              <p:par>
+                                <p:cTn id="5" presetID="10" presetClass="entr" presetSubtype="0" fill="hold" nodeType="clickEffect">
+                                  <p:stCondLst>
+                                    <p:cond delay="0"/>
+                                  </p:stCondLst>
+                                  <p:childTnLst>
+                                    <p:set>
+                                      <p:cBhvr>
+                                        <p:cTn id="6" dur="1" fill="hold">
+                                          <p:stCondLst>
+                                            <p:cond delay="0"/>
+                                          </p:stCondLst>
+                                        </p:cTn>
+                                        <p:tgtEl>
+                                          <p:spTgt spid="3"/>
+                                        </p:tgtEl>
+                                        <p:attrNameLst>
+                                          <p:attrName>style.visibility</p:attrName>
+                                        </p:attrNameLst>
+                                      </p:cBhvr>
+                                      <p:to>
+                                        <p:strVal val="visible"/>
+                                      </p:to>
+                                    </p:set>
+                                    <p:animEffect transition="in" filter="fade">
+                                      <p:cBhvr>
+                                        <p:cTn id="7" dur="500"/>
+                                        <p:tgtEl>
+                                          <p:spTgt spid="3"/>
+                                        </p:tgtEl>
+                                      </p:cBhvr>
+                                    </p:animEffect>
+                                  </p:childTnLst>
+                                </p:cTn>
+                              </p:par>
+                            </p:childTnLst>
+                          </p:cTn>
+                        </p:par>
+                      </p:childTnLst>
+                    </p:cTn>
+                  </p:par>
+                </p:childTnLst>
+              </p:cTn>
+              <p:prevCondLst>
+                <p:cond evt="onPrev" delay="0">
+                  <p:tgtEl>
+                    <p:sldTgt/>
+                  </p:tgtEl>
+                </p:cond>
+              </p:prevCondLst>
+              <p:nextCondLst>
+                <p:cond evt="onNext" delay="0">
+                  <p:tgtEl>
+                    <p:sldTgt/>
+                  </p:tgtEl>
+                </p:cond>
+              </p:nextCondLst>
+            </p:seq>
+          </p:childTnLst>
+        </p:cTn>
+      </p:par>
+    </p:tnLst>
+  </p:timing>
+</p:sld>
+</file>
+
+<file path=ppt/slides/slide27.xml><?xml version="1.0" encoding="utf-8"?>
+<p:sld xmlns:a="http://schemas.openxmlformats.org/drawingml/2006/main" xmlns:r="http://schemas.openxmlformats.org/officeDocument/2006/relationships" xmlns:p="http://schemas.openxmlformats.org/presentationml/2006/main">
+  <p:cSld>
+    <p:spTree>
+      <p:nvGrpSpPr>
+        <p:cNvPr id="1" name=""/>
+        <p:cNvGrpSpPr/>
+        <p:nvPr/>
+      </p:nvGrpSpPr>
+      <p:grpSpPr>
+        <a:xfrm>
+          <a:off x="0" y="0"/>
+          <a:ext cx="0" cy="0"/>
+          <a:chOff x="0" y="0"/>
+          <a:chExt cx="0" cy="0"/>
+        </a:xfrm>
+      </p:grpSpPr>
+      <p:sp>
+        <p:nvSpPr>
+          <p:cNvPr id="2" name="Title 1"/>
+          <p:cNvSpPr>
+            <a:spLocks noGrp="1"/>
+          </p:cNvSpPr>
+          <p:nvPr>
+            <p:ph type="title"/>
+          </p:nvPr>
+        </p:nvSpPr>
+        <p:spPr/>
+        <p:txBody>
+          <a:bodyPr/>
+          <a:lstStyle/>
+          <a:p>
+            <a:pPr algn="r" rtl="1"/>
+            <a:r>
+              <a:rPr lang="en-US" b="1" dirty="0"/>
+              <a:t>Training</a:t>
+            </a:r>
+            <a:endParaRPr lang="en-US" dirty="0"/>
+          </a:p>
+        </p:txBody>
+      </p:sp>
+      <p:sp>
+        <p:nvSpPr>
+          <p:cNvPr id="4" name="Slide Number Placeholder 3"/>
+          <p:cNvSpPr>
+            <a:spLocks noGrp="1"/>
+          </p:cNvSpPr>
+          <p:nvPr>
+            <p:ph type="sldNum" sz="quarter" idx="12"/>
+          </p:nvPr>
+        </p:nvSpPr>
+        <p:spPr/>
+        <p:txBody>
+          <a:bodyPr/>
+          <a:lstStyle/>
+          <a:p>
+            <a:fld id="{18087783-62FF-446C-A2E4-4C6B0B0DE16F}" type="slidenum">
+              <a:rPr lang="en-US" smtClean="0"/>
+              <a:t>27</a:t>
+            </a:fld>
+            <a:endParaRPr lang="en-US"/>
+          </a:p>
+        </p:txBody>
+      </p:sp>
+      <p:sp>
+        <p:nvSpPr>
+          <p:cNvPr id="6" name="Content Placeholder 5"/>
+          <p:cNvSpPr>
+            <a:spLocks noGrp="1"/>
+          </p:cNvSpPr>
+          <p:nvPr>
+            <p:ph idx="1"/>
+          </p:nvPr>
+        </p:nvSpPr>
+        <p:spPr/>
+        <p:txBody>
+          <a:bodyPr>
+            <a:normAutofit/>
+          </a:bodyPr>
+          <a:lstStyle/>
+          <a:p>
+            <a:pPr algn="r" rtl="1">
+              <a:lnSpc>
+                <a:spcPct val="150000"/>
+              </a:lnSpc>
+            </a:pPr>
+            <a:r>
+              <a:rPr lang="fa-IR" sz="2400" dirty="0" smtClean="0">
+                <a:cs typeface="B Nazanin" panose="00000400000000000000" pitchFamily="2" charset="-78"/>
+              </a:rPr>
+              <a:t>یادگیری </a:t>
+            </a:r>
+            <a:r>
+              <a:rPr lang="fa-IR" sz="2400" dirty="0">
+                <a:cs typeface="B Nazanin" panose="00000400000000000000" pitchFamily="2" charset="-78"/>
+              </a:rPr>
+              <a:t>این روش دارای دو بخش زیر است :</a:t>
+            </a:r>
+            <a:endParaRPr lang="en-US" sz="2400" dirty="0">
+              <a:cs typeface="B Nazanin" panose="00000400000000000000" pitchFamily="2" charset="-78"/>
+            </a:endParaRPr>
+          </a:p>
+          <a:p>
+            <a:pPr marL="749808" lvl="1" indent="-457200" algn="r" rtl="1">
+              <a:lnSpc>
+                <a:spcPct val="150000"/>
+              </a:lnSpc>
+              <a:buFont typeface="+mj-lt"/>
+              <a:buAutoNum type="arabicPeriod"/>
+            </a:pPr>
+            <a:r>
+              <a:rPr lang="en-US" sz="2400" dirty="0">
+                <a:cs typeface="B Nazanin" panose="00000400000000000000" pitchFamily="2" charset="-78"/>
+              </a:rPr>
+              <a:t>Ground Truth Label </a:t>
+            </a:r>
+            <a:r>
+              <a:rPr lang="en-US" sz="2400" dirty="0" smtClean="0">
+                <a:cs typeface="B Nazanin" panose="00000400000000000000" pitchFamily="2" charset="-78"/>
+              </a:rPr>
+              <a:t>Generation</a:t>
+            </a:r>
+            <a:endParaRPr lang="en-US" sz="2400" dirty="0">
+              <a:cs typeface="B Nazanin" panose="00000400000000000000" pitchFamily="2" charset="-78"/>
+            </a:endParaRPr>
+          </a:p>
+          <a:p>
+            <a:pPr marL="749808" lvl="1" indent="-457200" algn="r" rtl="1">
+              <a:lnSpc>
+                <a:spcPct val="150000"/>
+              </a:lnSpc>
+              <a:buFont typeface="+mj-lt"/>
+              <a:buAutoNum type="arabicPeriod"/>
+            </a:pPr>
+            <a:r>
+              <a:rPr lang="en-US" sz="2400" dirty="0">
+                <a:cs typeface="B Nazanin" panose="00000400000000000000" pitchFamily="2" charset="-78"/>
+              </a:rPr>
+              <a:t>Weakly-Supervised Learning</a:t>
+            </a:r>
+          </a:p>
+          <a:p>
+            <a:pPr marL="0" indent="0" algn="r">
+              <a:lnSpc>
+                <a:spcPct val="150000"/>
+              </a:lnSpc>
+              <a:buNone/>
+            </a:pPr>
+            <a:endParaRPr lang="en-US" sz="2400" dirty="0">
+              <a:cs typeface="B Nazanin" panose="00000400000000000000" pitchFamily="2" charset="-78"/>
+            </a:endParaRPr>
+          </a:p>
+        </p:txBody>
+      </p:sp>
+    </p:spTree>
+    <p:extLst>
+      <p:ext uri="{BB962C8B-B14F-4D97-AF65-F5344CB8AC3E}">
+        <p14:creationId xmlns:p14="http://schemas.microsoft.com/office/powerpoint/2010/main" val="4229139829"/>
+      </p:ext>
+    </p:extLst>
+  </p:cSld>
+  <p:clrMapOvr>
+    <a:masterClrMapping/>
+  </p:clrMapOvr>
+  <p:timing>
+    <p:tnLst>
+      <p:par>
+        <p:cTn id="1" dur="indefinite" restart="never" nodeType="tmRoot">
+          <p:childTnLst>
+            <p:seq concurrent="1" nextAc="seek">
+              <p:cTn id="2" dur="indefinite" nodeType="mainSeq">
+                <p:childTnLst>
+                  <p:par>
+                    <p:cTn id="3" fill="hold">
+                      <p:stCondLst>
+                        <p:cond delay="indefinite"/>
+                      </p:stCondLst>
+                      <p:childTnLst>
+                        <p:par>
+                          <p:cTn id="4" fill="hold">
+                            <p:stCondLst>
+                              <p:cond delay="0"/>
+                            </p:stCondLst>
+                            <p:childTnLst>
+                              <p:par>
+                                <p:cTn id="5" presetID="10" presetClass="entr" presetSubtype="0" fill="hold" nodeType="clickEffect">
+                                  <p:stCondLst>
+                                    <p:cond delay="0"/>
+                                  </p:stCondLst>
+                                  <p:childTnLst>
+                                    <p:set>
+                                      <p:cBhvr>
+                                        <p:cTn id="6" dur="1" fill="hold">
+                                          <p:stCondLst>
+                                            <p:cond delay="0"/>
+                                          </p:stCondLst>
+                                        </p:cTn>
+                                        <p:tgtEl>
+                                          <p:spTgt spid="6">
+                                            <p:txEl>
+                                              <p:pRg st="0" end="0"/>
+                                            </p:txEl>
+                                          </p:spTgt>
+                                        </p:tgtEl>
+                                        <p:attrNameLst>
+                                          <p:attrName>style.visibility</p:attrName>
+                                        </p:attrNameLst>
+                                      </p:cBhvr>
+                                      <p:to>
+                                        <p:strVal val="visible"/>
+                                      </p:to>
+                                    </p:set>
+                                    <p:animEffect transition="in" filter="fade">
+                                      <p:cBhvr>
+                                        <p:cTn id="7" dur="500"/>
+                                        <p:tgtEl>
+                                          <p:spTgt spid="6">
+                                            <p:txEl>
+                                              <p:pRg st="0" end="0"/>
+                                            </p:txEl>
+                                          </p:spTgt>
+                                        </p:tgtEl>
+                                      </p:cBhvr>
+                                    </p:animEffect>
+                                  </p:childTnLst>
+                                </p:cTn>
+                              </p:par>
+                            </p:childTnLst>
+                          </p:cTn>
+                        </p:par>
+                      </p:childTnLst>
+                    </p:cTn>
+                  </p:par>
+                  <p:par>
+                    <p:cTn id="8" fill="hold">
+                      <p:stCondLst>
+                        <p:cond delay="indefinite"/>
+                      </p:stCondLst>
+                      <p:childTnLst>
+                        <p:par>
+                          <p:cTn id="9" fill="hold">
+                            <p:stCondLst>
+                              <p:cond delay="0"/>
+                            </p:stCondLst>
+                            <p:childTnLst>
+                              <p:par>
+                                <p:cTn id="10" presetID="10" presetClass="entr" presetSubtype="0" fill="hold" nodeType="clickEffect">
+                                  <p:stCondLst>
+                                    <p:cond delay="0"/>
+                                  </p:stCondLst>
+                                  <p:childTnLst>
+                                    <p:set>
+                                      <p:cBhvr>
+                                        <p:cTn id="11" dur="1" fill="hold">
+                                          <p:stCondLst>
+                                            <p:cond delay="0"/>
+                                          </p:stCondLst>
+                                        </p:cTn>
+                                        <p:tgtEl>
+                                          <p:spTgt spid="6">
+                                            <p:txEl>
+                                              <p:pRg st="1" end="1"/>
+                                            </p:txEl>
+                                          </p:spTgt>
+                                        </p:tgtEl>
+                                        <p:attrNameLst>
+                                          <p:attrName>style.visibility</p:attrName>
+                                        </p:attrNameLst>
+                                      </p:cBhvr>
+                                      <p:to>
+                                        <p:strVal val="visible"/>
+                                      </p:to>
+                                    </p:set>
+                                    <p:animEffect transition="in" filter="fade">
+                                      <p:cBhvr>
+                                        <p:cTn id="12" dur="500"/>
+                                        <p:tgtEl>
+                                          <p:spTgt spid="6">
+                                            <p:txEl>
+                                              <p:pRg st="1" end="1"/>
+                                            </p:txEl>
+                                          </p:spTgt>
+                                        </p:tgtEl>
+                                      </p:cBhvr>
+                                    </p:animEffect>
+                                  </p:childTnLst>
+                                </p:cTn>
+                              </p:par>
+                            </p:childTnLst>
+                          </p:cTn>
+                        </p:par>
+                      </p:childTnLst>
+                    </p:cTn>
+                  </p:par>
+                  <p:par>
+                    <p:cTn id="13" fill="hold">
+                      <p:stCondLst>
+                        <p:cond delay="indefinite"/>
+                      </p:stCondLst>
+                      <p:childTnLst>
+                        <p:par>
+                          <p:cTn id="14" fill="hold">
+                            <p:stCondLst>
+                              <p:cond delay="0"/>
+                            </p:stCondLst>
+                            <p:childTnLst>
+                              <p:par>
+                                <p:cTn id="15" presetID="10" presetClass="entr" presetSubtype="0" fill="hold" nodeType="clickEffect">
+                                  <p:stCondLst>
+                                    <p:cond delay="0"/>
+                                  </p:stCondLst>
+                                  <p:childTnLst>
+                                    <p:set>
+                                      <p:cBhvr>
+                                        <p:cTn id="16" dur="1" fill="hold">
+                                          <p:stCondLst>
+                                            <p:cond delay="0"/>
+                                          </p:stCondLst>
+                                        </p:cTn>
+                                        <p:tgtEl>
+                                          <p:spTgt spid="6">
+                                            <p:txEl>
+                                              <p:pRg st="2" end="2"/>
+                                            </p:txEl>
+                                          </p:spTgt>
+                                        </p:tgtEl>
+                                        <p:attrNameLst>
+                                          <p:attrName>style.visibility</p:attrName>
+                                        </p:attrNameLst>
+                                      </p:cBhvr>
+                                      <p:to>
+                                        <p:strVal val="visible"/>
+                                      </p:to>
+                                    </p:set>
+                                    <p:animEffect transition="in" filter="fade">
+                                      <p:cBhvr>
+                                        <p:cTn id="17" dur="500"/>
+                                        <p:tgtEl>
+                                          <p:spTgt spid="6">
+                                            <p:txEl>
+                                              <p:pRg st="2" end="2"/>
+                                            </p:txEl>
+                                          </p:spTgt>
+                                        </p:tgtEl>
+                                      </p:cBhvr>
+                                    </p:animEffect>
+                                  </p:childTnLst>
+                                </p:cTn>
+                              </p:par>
+                            </p:childTnLst>
+                          </p:cTn>
+                        </p:par>
+                      </p:childTnLst>
+                    </p:cTn>
+                  </p:par>
+                </p:childTnLst>
+              </p:cTn>
+              <p:prevCondLst>
+                <p:cond evt="onPrev" delay="0">
+                  <p:tgtEl>
+                    <p:sldTgt/>
+                  </p:tgtEl>
+                </p:cond>
+              </p:prevCondLst>
+              <p:nextCondLst>
+                <p:cond evt="onNext" delay="0">
+                  <p:tgtEl>
+                    <p:sldTgt/>
+                  </p:tgtEl>
+                </p:cond>
+              </p:nextCondLst>
+            </p:seq>
+          </p:childTnLst>
+        </p:cTn>
+      </p:par>
+    </p:tnLst>
+  </p:timing>
+</p:sld>
+</file>
+
+<file path=ppt/slides/slide28.xml><?xml version="1.0" encoding="utf-8"?>
+<p:sld xmlns:a="http://schemas.openxmlformats.org/drawingml/2006/main" xmlns:r="http://schemas.openxmlformats.org/officeDocument/2006/relationships" xmlns:p="http://schemas.openxmlformats.org/presentationml/2006/main">
+  <p:cSld>
+    <p:spTree>
+      <p:nvGrpSpPr>
+        <p:cNvPr id="1" name=""/>
+        <p:cNvGrpSpPr/>
+        <p:nvPr/>
+      </p:nvGrpSpPr>
+      <p:grpSpPr>
+        <a:xfrm>
+          <a:off x="0" y="0"/>
+          <a:ext cx="0" cy="0"/>
+          <a:chOff x="0" y="0"/>
+          <a:chExt cx="0" cy="0"/>
+        </a:xfrm>
+      </p:grpSpPr>
+      <p:sp>
+        <p:nvSpPr>
+          <p:cNvPr id="2" name="Title 1"/>
+          <p:cNvSpPr>
+            <a:spLocks noGrp="1"/>
+          </p:cNvSpPr>
+          <p:nvPr>
+            <p:ph type="title"/>
+          </p:nvPr>
+        </p:nvSpPr>
+        <p:spPr/>
+        <p:txBody>
+          <a:bodyPr>
+            <a:normAutofit/>
+          </a:bodyPr>
+          <a:lstStyle/>
+          <a:p>
+            <a:pPr lvl="1" algn="r" rtl="1">
+              <a:lnSpc>
+                <a:spcPct val="85000"/>
+              </a:lnSpc>
+              <a:spcBef>
+                <a:spcPct val="0"/>
+              </a:spcBef>
+            </a:pPr>
+            <a:r>
+              <a:rPr lang="en-US" sz="4800" dirty="0" smtClean="0">
+                <a:solidFill>
+                  <a:schemeClr val="tx1">
+                    <a:lumMod val="75000"/>
+                    <a:lumOff val="25000"/>
+                  </a:schemeClr>
+                </a:solidFill>
+                <a:latin typeface="+mj-lt"/>
+                <a:cs typeface="B Nazanin" panose="00000400000000000000" pitchFamily="2" charset="-78"/>
+              </a:rPr>
+              <a:t>Ground Truth Label Generation .1</a:t>
+            </a:r>
+            <a:endParaRPr lang="en-US" sz="4800" dirty="0">
+              <a:solidFill>
+                <a:schemeClr val="tx1">
+                  <a:lumMod val="75000"/>
+                  <a:lumOff val="25000"/>
+                </a:schemeClr>
+              </a:solidFill>
+              <a:latin typeface="+mj-lt"/>
+              <a:cs typeface="B Nazanin" panose="00000400000000000000" pitchFamily="2" charset="-78"/>
+            </a:endParaRPr>
+          </a:p>
+        </p:txBody>
+      </p:sp>
+      <p:sp>
+        <p:nvSpPr>
+          <p:cNvPr id="3" name="Content Placeholder 2"/>
+          <p:cNvSpPr>
+            <a:spLocks noGrp="1"/>
+          </p:cNvSpPr>
+          <p:nvPr>
+            <p:ph idx="1"/>
+          </p:nvPr>
+        </p:nvSpPr>
+        <p:spPr/>
+        <p:txBody>
+          <a:bodyPr/>
+          <a:lstStyle/>
+          <a:p>
+            <a:pPr algn="r" rtl="1">
+              <a:lnSpc>
+                <a:spcPct val="200000"/>
+              </a:lnSpc>
+              <a:buFont typeface="Wingdings" panose="05000000000000000000" pitchFamily="2" charset="2"/>
+              <a:buChar char="Ø"/>
+            </a:pPr>
+            <a:r>
+              <a:rPr lang="fa-IR" sz="2400" dirty="0">
+                <a:cs typeface="B Nazanin" panose="00000400000000000000" pitchFamily="2" charset="-78"/>
+              </a:rPr>
+              <a:t>در این بخش به ازای هر عکس، باتوجه به </a:t>
+            </a:r>
+            <a:r>
+              <a:rPr lang="en-US" sz="2400" dirty="0">
+                <a:cs typeface="B Nazanin" panose="00000400000000000000" pitchFamily="2" charset="-78"/>
+              </a:rPr>
+              <a:t>region score</a:t>
+            </a:r>
+            <a:r>
+              <a:rPr lang="fa-IR" sz="2400" dirty="0">
+                <a:cs typeface="B Nazanin" panose="00000400000000000000" pitchFamily="2" charset="-78"/>
+              </a:rPr>
+              <a:t> و </a:t>
+            </a:r>
+            <a:r>
+              <a:rPr lang="en-US" sz="2400" dirty="0">
+                <a:cs typeface="B Nazanin" panose="00000400000000000000" pitchFamily="2" charset="-78"/>
+              </a:rPr>
+              <a:t>affinity score</a:t>
+            </a:r>
+            <a:r>
+              <a:rPr lang="fa-IR" sz="2400" dirty="0">
+                <a:cs typeface="B Nazanin" panose="00000400000000000000" pitchFamily="2" charset="-78"/>
+              </a:rPr>
+              <a:t>، برای </a:t>
+            </a:r>
+            <a:r>
+              <a:rPr lang="en-US" sz="2400" dirty="0">
+                <a:cs typeface="B Nazanin" panose="00000400000000000000" pitchFamily="2" charset="-78"/>
+              </a:rPr>
+              <a:t>bounding box</a:t>
+            </a:r>
+            <a:r>
+              <a:rPr lang="fa-IR" sz="2400" dirty="0">
+                <a:cs typeface="B Nazanin" panose="00000400000000000000" pitchFamily="2" charset="-78"/>
+              </a:rPr>
+              <a:t> هر کاراکتر یک برچسب تولید می شود</a:t>
+            </a:r>
+            <a:r>
+              <a:rPr lang="fa-IR" sz="2400" dirty="0" smtClean="0">
+                <a:cs typeface="B Nazanin" panose="00000400000000000000" pitchFamily="2" charset="-78"/>
+              </a:rPr>
+              <a:t>.</a:t>
+            </a:r>
+            <a:endParaRPr lang="en-US" sz="2400" dirty="0" smtClean="0">
+              <a:cs typeface="B Nazanin" panose="00000400000000000000" pitchFamily="2" charset="-78"/>
+            </a:endParaRPr>
+          </a:p>
+          <a:p>
+            <a:pPr algn="r" rtl="1">
+              <a:lnSpc>
+                <a:spcPct val="200000"/>
+              </a:lnSpc>
+              <a:buFont typeface="Wingdings" panose="05000000000000000000" pitchFamily="2" charset="2"/>
+              <a:buChar char="Ø"/>
+            </a:pPr>
+            <a:r>
+              <a:rPr lang="fa-IR" sz="2400" dirty="0" smtClean="0">
+                <a:cs typeface="B Nazanin" panose="00000400000000000000" pitchFamily="2" charset="-78"/>
+              </a:rPr>
+              <a:t> </a:t>
+            </a:r>
+            <a:r>
+              <a:rPr lang="en-US" sz="2400" dirty="0">
+                <a:cs typeface="B Nazanin" panose="00000400000000000000" pitchFamily="2" charset="-78"/>
+              </a:rPr>
+              <a:t>region score</a:t>
+            </a:r>
+            <a:r>
+              <a:rPr lang="fa-IR" sz="2400" dirty="0">
+                <a:cs typeface="B Nazanin" panose="00000400000000000000" pitchFamily="2" charset="-78"/>
+              </a:rPr>
+              <a:t> احتمال مرکز کاراکتر بودن هر پیکسل را نشان می </a:t>
+            </a:r>
+            <a:r>
+              <a:rPr lang="fa-IR" sz="2400" dirty="0" smtClean="0">
+                <a:cs typeface="B Nazanin" panose="00000400000000000000" pitchFamily="2" charset="-78"/>
+              </a:rPr>
+              <a:t>دهد</a:t>
+            </a:r>
+            <a:r>
+              <a:rPr lang="en-US" sz="2400" dirty="0" smtClean="0">
+                <a:cs typeface="B Nazanin" panose="00000400000000000000" pitchFamily="2" charset="-78"/>
+              </a:rPr>
+              <a:t>.</a:t>
+            </a:r>
+            <a:r>
+              <a:rPr lang="fa-IR" sz="2400" dirty="0" smtClean="0">
+                <a:cs typeface="B Nazanin" panose="00000400000000000000" pitchFamily="2" charset="-78"/>
+              </a:rPr>
+              <a:t> </a:t>
+            </a:r>
+            <a:endParaRPr lang="en-US" sz="2400" dirty="0" smtClean="0">
+              <a:cs typeface="B Nazanin" panose="00000400000000000000" pitchFamily="2" charset="-78"/>
+            </a:endParaRPr>
+          </a:p>
+          <a:p>
+            <a:pPr algn="r" rtl="1">
+              <a:lnSpc>
+                <a:spcPct val="200000"/>
+              </a:lnSpc>
+              <a:buFont typeface="Wingdings" panose="05000000000000000000" pitchFamily="2" charset="2"/>
+              <a:buChar char="Ø"/>
+            </a:pPr>
+            <a:r>
+              <a:rPr lang="fa-IR" sz="2400" dirty="0" smtClean="0">
+                <a:cs typeface="B Nazanin" panose="00000400000000000000" pitchFamily="2" charset="-78"/>
+              </a:rPr>
+              <a:t> </a:t>
+            </a:r>
+            <a:r>
+              <a:rPr lang="en-US" sz="2400" dirty="0">
+                <a:cs typeface="B Nazanin" panose="00000400000000000000" pitchFamily="2" charset="-78"/>
+              </a:rPr>
+              <a:t>affinity score</a:t>
+            </a:r>
+            <a:r>
+              <a:rPr lang="fa-IR" sz="2400" dirty="0">
+                <a:cs typeface="B Nazanin" panose="00000400000000000000" pitchFamily="2" charset="-78"/>
+              </a:rPr>
+              <a:t>  برای هر پیکسل، احتمال اینکه مرکز بین دو کاراکتر مجاور باشد را بازنمایی می نماید. </a:t>
+            </a:r>
+            <a:endParaRPr lang="en-US" sz="2400" dirty="0">
+              <a:cs typeface="B Nazanin" panose="00000400000000000000" pitchFamily="2" charset="-78"/>
+            </a:endParaRPr>
+          </a:p>
+          <a:p>
+            <a:pPr algn="r"/>
+            <a:endParaRPr lang="en-US" dirty="0">
+              <a:cs typeface="B Nazanin" panose="00000400000000000000" pitchFamily="2" charset="-78"/>
+            </a:endParaRPr>
+          </a:p>
+        </p:txBody>
+      </p:sp>
+      <p:sp>
+        <p:nvSpPr>
+          <p:cNvPr id="4" name="Slide Number Placeholder 3"/>
+          <p:cNvSpPr>
+            <a:spLocks noGrp="1"/>
+          </p:cNvSpPr>
+          <p:nvPr>
+            <p:ph type="sldNum" sz="quarter" idx="12"/>
+          </p:nvPr>
+        </p:nvSpPr>
+        <p:spPr/>
+        <p:txBody>
+          <a:bodyPr/>
+          <a:lstStyle/>
+          <a:p>
+            <a:fld id="{18087783-62FF-446C-A2E4-4C6B0B0DE16F}" type="slidenum">
+              <a:rPr lang="en-US" smtClean="0"/>
+              <a:t>28</a:t>
+            </a:fld>
+            <a:endParaRPr lang="en-US"/>
+          </a:p>
+        </p:txBody>
+      </p:sp>
+    </p:spTree>
+    <p:extLst>
+      <p:ext uri="{BB962C8B-B14F-4D97-AF65-F5344CB8AC3E}">
+        <p14:creationId xmlns:p14="http://schemas.microsoft.com/office/powerpoint/2010/main" val="3722333669"/>
+      </p:ext>
+    </p:extLst>
+  </p:cSld>
+  <p:clrMapOvr>
+    <a:masterClrMapping/>
+  </p:clrMapOvr>
+  <p:timing>
+    <p:tnLst>
+      <p:par>
+        <p:cTn id="1" dur="indefinite" restart="never" nodeType="tmRoot">
+          <p:childTnLst>
+            <p:seq concurrent="1" nextAc="seek">
+              <p:cTn id="2" dur="indefinite" nodeType="mainSeq">
+                <p:childTnLst>
+                  <p:par>
+                    <p:cTn id="3" fill="hold">
+                      <p:stCondLst>
+                        <p:cond delay="indefinite"/>
+                      </p:stCondLst>
+                      <p:childTnLst>
+                        <p:par>
+                          <p:cTn id="4" fill="hold">
+                            <p:stCondLst>
+                              <p:cond delay="0"/>
+                            </p:stCondLst>
+                            <p:childTnLst>
+                              <p:par>
+                                <p:cTn id="5" presetID="10" presetClass="entr" presetSubtype="0" fill="hold" nodeType="clickEffect">
+                                  <p:stCondLst>
+                                    <p:cond delay="0"/>
+                                  </p:stCondLst>
+                                  <p:childTnLst>
+                                    <p:set>
+                                      <p:cBhvr>
+                                        <p:cTn id="6" dur="1" fill="hold">
+                                          <p:stCondLst>
+                                            <p:cond delay="0"/>
+                                          </p:stCondLst>
+                                        </p:cTn>
+                                        <p:tgtEl>
+                                          <p:spTgt spid="3">
+                                            <p:txEl>
+                                              <p:pRg st="0" end="0"/>
+                                            </p:txEl>
+                                          </p:spTgt>
+                                        </p:tgtEl>
+                                        <p:attrNameLst>
+                                          <p:attrName>style.visibility</p:attrName>
+                                        </p:attrNameLst>
+                                      </p:cBhvr>
+                                      <p:to>
+                                        <p:strVal val="visible"/>
+                                      </p:to>
+                                    </p:set>
+                                    <p:animEffect transition="in" filter="fade">
+                                      <p:cBhvr>
+                                        <p:cTn id="7" dur="500"/>
+                                        <p:tgtEl>
+                                          <p:spTgt spid="3">
+                                            <p:txEl>
+                                              <p:pRg st="0" end="0"/>
+                                            </p:txEl>
+                                          </p:spTgt>
+                                        </p:tgtEl>
+                                      </p:cBhvr>
+                                    </p:animEffect>
+                                  </p:childTnLst>
+                                </p:cTn>
+                              </p:par>
+                            </p:childTnLst>
+                          </p:cTn>
+                        </p:par>
+                      </p:childTnLst>
+                    </p:cTn>
+                  </p:par>
+                  <p:par>
+                    <p:cTn id="8" fill="hold">
+                      <p:stCondLst>
+                        <p:cond delay="indefinite"/>
+                      </p:stCondLst>
+                      <p:childTnLst>
+                        <p:par>
+                          <p:cTn id="9" fill="hold">
+                            <p:stCondLst>
+                              <p:cond delay="0"/>
+                            </p:stCondLst>
+                            <p:childTnLst>
+                              <p:par>
+                                <p:cTn id="10" presetID="10" presetClass="entr" presetSubtype="0" fill="hold" nodeType="clickEffect">
+                                  <p:stCondLst>
+                                    <p:cond delay="0"/>
+                                  </p:stCondLst>
+                                  <p:childTnLst>
+                                    <p:set>
+                                      <p:cBhvr>
+                                        <p:cTn id="11" dur="1" fill="hold">
+                                          <p:stCondLst>
+                                            <p:cond delay="0"/>
+                                          </p:stCondLst>
+                                        </p:cTn>
+                                        <p:tgtEl>
+                                          <p:spTgt spid="3">
+                                            <p:txEl>
+                                              <p:pRg st="1" end="1"/>
+                                            </p:txEl>
+                                          </p:spTgt>
+                                        </p:tgtEl>
+                                        <p:attrNameLst>
+                                          <p:attrName>style.visibility</p:attrName>
+                                        </p:attrNameLst>
+                                      </p:cBhvr>
+                                      <p:to>
+                                        <p:strVal val="visible"/>
+                                      </p:to>
+                                    </p:set>
+                                    <p:animEffect transition="in" filter="fade">
+                                      <p:cBhvr>
+                                        <p:cTn id="12" dur="500"/>
+                                        <p:tgtEl>
+                                          <p:spTgt spid="3">
+                                            <p:txEl>
+                                              <p:pRg st="1" end="1"/>
+                                            </p:txEl>
+                                          </p:spTgt>
+                                        </p:tgtEl>
+                                      </p:cBhvr>
+                                    </p:animEffect>
+                                  </p:childTnLst>
+                                </p:cTn>
+                              </p:par>
+                            </p:childTnLst>
+                          </p:cTn>
+                        </p:par>
+                      </p:childTnLst>
+                    </p:cTn>
+                  </p:par>
+                  <p:par>
+                    <p:cTn id="13" fill="hold">
+                      <p:stCondLst>
+                        <p:cond delay="indefinite"/>
+                      </p:stCondLst>
+                      <p:childTnLst>
+                        <p:par>
+                          <p:cTn id="14" fill="hold">
+                            <p:stCondLst>
+                              <p:cond delay="0"/>
+                            </p:stCondLst>
+                            <p:childTnLst>
+                              <p:par>
+                                <p:cTn id="15" presetID="10" presetClass="entr" presetSubtype="0" fill="hold" nodeType="clickEffect">
+                                  <p:stCondLst>
+                                    <p:cond delay="0"/>
+                                  </p:stCondLst>
+                                  <p:childTnLst>
+                                    <p:set>
+                                      <p:cBhvr>
+                                        <p:cTn id="16" dur="1" fill="hold">
+                                          <p:stCondLst>
+                                            <p:cond delay="0"/>
+                                          </p:stCondLst>
+                                        </p:cTn>
+                                        <p:tgtEl>
+                                          <p:spTgt spid="3">
+                                            <p:txEl>
+                                              <p:pRg st="2" end="2"/>
+                                            </p:txEl>
+                                          </p:spTgt>
+                                        </p:tgtEl>
+                                        <p:attrNameLst>
+                                          <p:attrName>style.visibility</p:attrName>
+                                        </p:attrNameLst>
+                                      </p:cBhvr>
+                                      <p:to>
+                                        <p:strVal val="visible"/>
+                                      </p:to>
+                                    </p:set>
+                                    <p:animEffect transition="in" filter="fade">
+                                      <p:cBhvr>
+                                        <p:cTn id="17" dur="500"/>
+                                        <p:tgtEl>
+                                          <p:spTgt spid="3">
+                                            <p:txEl>
+                                              <p:pRg st="2" end="2"/>
+                                            </p:txEl>
+                                          </p:spTgt>
+                                        </p:tgtEl>
+                                      </p:cBhvr>
+                                    </p:animEffect>
+                                  </p:childTnLst>
+                                </p:cTn>
+                              </p:par>
+                            </p:childTnLst>
+                          </p:cTn>
+                        </p:par>
+                      </p:childTnLst>
+                    </p:cTn>
+                  </p:par>
+                </p:childTnLst>
+              </p:cTn>
+              <p:prevCondLst>
+                <p:cond evt="onPrev" delay="0">
+                  <p:tgtEl>
+                    <p:sldTgt/>
+                  </p:tgtEl>
+                </p:cond>
+              </p:prevCondLst>
+              <p:nextCondLst>
+                <p:cond evt="onNext" delay="0">
+                  <p:tgtEl>
+                    <p:sldTgt/>
+                  </p:tgtEl>
+                </p:cond>
+              </p:nextCondLst>
+            </p:seq>
+          </p:childTnLst>
+        </p:cTn>
+      </p:par>
+    </p:tnLst>
+  </p:timing>
+</p:sld>
+</file>
+
+<file path=ppt/slides/slide29.xml><?xml version="1.0" encoding="utf-8"?>
+<p:sld xmlns:a="http://schemas.openxmlformats.org/drawingml/2006/main" xmlns:r="http://schemas.openxmlformats.org/officeDocument/2006/relationships" xmlns:p="http://schemas.openxmlformats.org/presentationml/2006/main">
+  <p:cSld>
+    <p:spTree>
+      <p:nvGrpSpPr>
+        <p:cNvPr id="1" name=""/>
+        <p:cNvGrpSpPr/>
+        <p:nvPr/>
+      </p:nvGrpSpPr>
+      <p:grpSpPr>
+        <a:xfrm>
+          <a:off x="0" y="0"/>
+          <a:ext cx="0" cy="0"/>
+          <a:chOff x="0" y="0"/>
+          <a:chExt cx="0" cy="0"/>
+        </a:xfrm>
+      </p:grpSpPr>
+      <p:sp>
+        <p:nvSpPr>
+          <p:cNvPr id="2" name="Title 1"/>
+          <p:cNvSpPr>
+            <a:spLocks noGrp="1"/>
+          </p:cNvSpPr>
+          <p:nvPr>
+            <p:ph type="title"/>
+          </p:nvPr>
+        </p:nvSpPr>
+        <p:spPr/>
+        <p:txBody>
+          <a:bodyPr/>
+          <a:lstStyle/>
+          <a:p>
+            <a:pPr algn="r" rtl="1"/>
+            <a:r>
+              <a:rPr lang="en-US" dirty="0">
+                <a:cs typeface="B Nazanin" panose="00000400000000000000" pitchFamily="2" charset="-78"/>
+              </a:rPr>
+              <a:t>Ground Truth Label Generation .1</a:t>
+            </a:r>
+            <a:endParaRPr lang="en-US" dirty="0"/>
+          </a:p>
+        </p:txBody>
+      </p:sp>
+      <p:sp>
+        <p:nvSpPr>
+          <p:cNvPr id="4" name="Slide Number Placeholder 3"/>
+          <p:cNvSpPr>
+            <a:spLocks noGrp="1"/>
+          </p:cNvSpPr>
+          <p:nvPr>
+            <p:ph type="sldNum" sz="quarter" idx="12"/>
+          </p:nvPr>
+        </p:nvSpPr>
+        <p:spPr/>
+        <p:txBody>
+          <a:bodyPr/>
+          <a:lstStyle/>
+          <a:p>
+            <a:fld id="{18087783-62FF-446C-A2E4-4C6B0B0DE16F}" type="slidenum">
+              <a:rPr lang="en-US" smtClean="0"/>
+              <a:t>29</a:t>
+            </a:fld>
+            <a:endParaRPr lang="en-US"/>
+          </a:p>
+        </p:txBody>
+      </p:sp>
+      <p:pic>
+        <p:nvPicPr>
+          <p:cNvPr id="5" name="Content Placeholder 4"/>
+          <p:cNvPicPr>
+            <a:picLocks noGrp="1"/>
+          </p:cNvPicPr>
+          <p:nvPr>
+            <p:ph idx="1"/>
+          </p:nvPr>
+        </p:nvPicPr>
+        <p:blipFill>
+          <a:blip r:embed="rId2"/>
+          <a:stretch>
+            <a:fillRect/>
+          </a:stretch>
+        </p:blipFill>
+        <p:spPr>
+          <a:xfrm>
+            <a:off x="743990" y="2337521"/>
+            <a:ext cx="10764980" cy="3720378"/>
+          </a:xfrm>
+          <a:prstGeom prst="rect">
+            <a:avLst/>
+          </a:prstGeom>
+        </p:spPr>
+      </p:pic>
+    </p:spTree>
+    <p:extLst>
+      <p:ext uri="{BB962C8B-B14F-4D97-AF65-F5344CB8AC3E}">
+        <p14:creationId xmlns:p14="http://schemas.microsoft.com/office/powerpoint/2010/main" val="3367226200"/>
+      </p:ext>
+    </p:extLst>
+  </p:cSld>
+  <p:clrMapOvr>
+    <a:masterClrMapping/>
+  </p:clrMapOvr>
+  <p:timing>
+    <p:tnLst>
+      <p:par>
+        <p:cTn id="1" dur="indefinite" restart="never" nodeType="tmRoot">
+          <p:childTnLst>
+            <p:seq concurrent="1" nextAc="seek">
+              <p:cTn id="2" dur="indefinite" nodeType="mainSeq">
+                <p:childTnLst>
+                  <p:par>
+                    <p:cTn id="3" fill="hold">
+                      <p:stCondLst>
+                        <p:cond delay="indefinite"/>
+                      </p:stCondLst>
+                      <p:childTnLst>
+                        <p:par>
+                          <p:cTn id="4" fill="hold">
+                            <p:stCondLst>
+                              <p:cond delay="0"/>
+                            </p:stCondLst>
+                            <p:childTnLst>
+                              <p:par>
+                                <p:cTn id="5" presetID="10" presetClass="entr" presetSubtype="0" fill="hold" nodeType="clickEffect">
+                                  <p:stCondLst>
+                                    <p:cond delay="0"/>
+                                  </p:stCondLst>
+                                  <p:childTnLst>
+                                    <p:set>
+                                      <p:cBhvr>
+                                        <p:cTn id="6" dur="1" fill="hold">
+                                          <p:stCondLst>
+                                            <p:cond delay="0"/>
+                                          </p:stCondLst>
+                                        </p:cTn>
+                                        <p:tgtEl>
+                                          <p:spTgt spid="5"/>
+                                        </p:tgtEl>
+                                        <p:attrNameLst>
+                                          <p:attrName>style.visibility</p:attrName>
+                                        </p:attrNameLst>
+                                      </p:cBhvr>
+                                      <p:to>
+                                        <p:strVal val="visible"/>
+                                      </p:to>
+                                    </p:set>
+                                    <p:animEffect transition="in" filter="fade">
+                                      <p:cBhvr>
+                                        <p:cTn id="7" dur="500"/>
+                                        <p:tgtEl>
+                                          <p:spTgt spid="5"/>
+                                        </p:tgtEl>
+                                      </p:cBhvr>
+                                    </p:animEffect>
+                                  </p:childTnLst>
+                                </p:cTn>
+                              </p:par>
+                            </p:childTnLst>
+                          </p:cTn>
+                        </p:par>
+                      </p:childTnLst>
+                    </p:cTn>
+                  </p:par>
+                </p:childTnLst>
+              </p:cTn>
+              <p:prevCondLst>
+                <p:cond evt="onPrev" delay="0">
+                  <p:tgtEl>
+                    <p:sldTgt/>
+                  </p:tgtEl>
+                </p:cond>
+              </p:prevCondLst>
+              <p:nextCondLst>
+                <p:cond evt="onNext" delay="0">
+                  <p:tgtEl>
+                    <p:sldTgt/>
+                  </p:tgtEl>
+                </p:cond>
+              </p:nextCondLst>
+            </p:seq>
+          </p:childTnLst>
+        </p:cTn>
+      </p:par>
+    </p:tnLst>
+  </p:timing>
+</p:sld>
+</file>
+
 <file path=ppt/slides/slide3.xml><?xml version="1.0" encoding="utf-8"?>
 <p:sld xmlns:a="http://schemas.openxmlformats.org/drawingml/2006/main" xmlns:r="http://schemas.openxmlformats.org/officeDocument/2006/relationships" xmlns:p="http://schemas.openxmlformats.org/presentationml/2006/main">
   <p:cSld>
@@ -20802,7 +23652,13 @@
               <a:rPr lang="fa-IR" sz="3000" dirty="0">
                 <a:cs typeface="B Nazanin" panose="00000400000000000000" pitchFamily="2" charset="-78"/>
               </a:rPr>
-              <a:t>بهبود پیشنهادات </a:t>
+              <a:t>بهبود </a:t>
+            </a:r>
+            <a:r>
+              <a:rPr lang="fa-IR" sz="3000" dirty="0" smtClean="0">
+                <a:cs typeface="B Nazanin" panose="00000400000000000000" pitchFamily="2" charset="-78"/>
+              </a:rPr>
+              <a:t>پیشنهادها </a:t>
             </a:r>
             <a:r>
               <a:rPr lang="fa-IR" sz="3000" dirty="0" smtClean="0">
@@ -21037,6 +23893,1062 @@
 </p:sld>
 </file>
 
+<file path=ppt/slides/slide30.xml><?xml version="1.0" encoding="utf-8"?>
+<p:sld xmlns:a="http://schemas.openxmlformats.org/drawingml/2006/main" xmlns:r="http://schemas.openxmlformats.org/officeDocument/2006/relationships" xmlns:p="http://schemas.openxmlformats.org/presentationml/2006/main">
+  <p:cSld>
+    <p:spTree>
+      <p:nvGrpSpPr>
+        <p:cNvPr id="1" name=""/>
+        <p:cNvGrpSpPr/>
+        <p:nvPr/>
+      </p:nvGrpSpPr>
+      <p:grpSpPr>
+        <a:xfrm>
+          <a:off x="0" y="0"/>
+          <a:ext cx="0" cy="0"/>
+          <a:chOff x="0" y="0"/>
+          <a:chExt cx="0" cy="0"/>
+        </a:xfrm>
+      </p:grpSpPr>
+      <p:sp>
+        <p:nvSpPr>
+          <p:cNvPr id="2" name="Title 1"/>
+          <p:cNvSpPr>
+            <a:spLocks noGrp="1"/>
+          </p:cNvSpPr>
+          <p:nvPr>
+            <p:ph type="title"/>
+          </p:nvPr>
+        </p:nvSpPr>
+        <p:spPr/>
+        <p:txBody>
+          <a:bodyPr/>
+          <a:lstStyle/>
+          <a:p>
+            <a:pPr algn="r"/>
+            <a:r>
+              <a:rPr lang="en-US" dirty="0">
+                <a:cs typeface="B Nazanin" panose="00000400000000000000" pitchFamily="2" charset="-78"/>
+              </a:rPr>
+              <a:t>Ground Truth Label Generation .1</a:t>
+            </a:r>
+            <a:endParaRPr lang="en-US" dirty="0"/>
+          </a:p>
+        </p:txBody>
+      </p:sp>
+      <p:sp>
+        <p:nvSpPr>
+          <p:cNvPr id="3" name="Content Placeholder 2"/>
+          <p:cNvSpPr>
+            <a:spLocks noGrp="1"/>
+          </p:cNvSpPr>
+          <p:nvPr>
+            <p:ph idx="1"/>
+          </p:nvPr>
+        </p:nvSpPr>
+        <p:spPr/>
+        <p:txBody>
+          <a:bodyPr/>
+          <a:lstStyle/>
+          <a:p>
+            <a:pPr algn="r" rtl="1"/>
+            <a:r>
+              <a:rPr lang="fa-IR" sz="2400" dirty="0">
+                <a:cs typeface="B Nazanin" panose="00000400000000000000" pitchFamily="2" charset="-78"/>
+              </a:rPr>
+              <a:t>برای تخمین زدن و تولید </a:t>
+            </a:r>
+            <a:r>
+              <a:rPr lang="en-US" sz="2400" dirty="0">
+                <a:cs typeface="B Nazanin" panose="00000400000000000000" pitchFamily="2" charset="-78"/>
+              </a:rPr>
+              <a:t>ground truth</a:t>
+            </a:r>
+            <a:r>
+              <a:rPr lang="fa-IR" sz="2400" dirty="0">
+                <a:cs typeface="B Nazanin" panose="00000400000000000000" pitchFamily="2" charset="-78"/>
+              </a:rPr>
+              <a:t> </a:t>
+            </a:r>
+            <a:r>
+              <a:rPr lang="fa-IR" sz="2400" dirty="0" smtClean="0">
+                <a:cs typeface="B Nazanin" panose="00000400000000000000" pitchFamily="2" charset="-78"/>
+              </a:rPr>
+              <a:t>برای</a:t>
+            </a:r>
+            <a:r>
+              <a:rPr lang="en-US" sz="2400" dirty="0" smtClean="0">
+                <a:cs typeface="B Nazanin" panose="00000400000000000000" pitchFamily="2" charset="-78"/>
+              </a:rPr>
+              <a:t>region </a:t>
+            </a:r>
+            <a:r>
+              <a:rPr lang="en-US" sz="2400" dirty="0">
+                <a:cs typeface="B Nazanin" panose="00000400000000000000" pitchFamily="2" charset="-78"/>
+              </a:rPr>
+              <a:t>score</a:t>
+            </a:r>
+            <a:r>
+              <a:rPr lang="fa-IR" sz="2400" dirty="0">
+                <a:cs typeface="B Nazanin" panose="00000400000000000000" pitchFamily="2" charset="-78"/>
+              </a:rPr>
+              <a:t> و </a:t>
+            </a:r>
+            <a:r>
+              <a:rPr lang="en-US" sz="2400" dirty="0">
+                <a:cs typeface="B Nazanin" panose="00000400000000000000" pitchFamily="2" charset="-78"/>
+              </a:rPr>
+              <a:t>affinity score</a:t>
+            </a:r>
+            <a:r>
+              <a:rPr lang="fa-IR" sz="2400" dirty="0">
+                <a:cs typeface="B Nazanin" panose="00000400000000000000" pitchFamily="2" charset="-78"/>
+              </a:rPr>
+              <a:t>، از سه مرحله استفاده می شود :</a:t>
+            </a:r>
+            <a:endParaRPr lang="en-US" sz="2400" dirty="0">
+              <a:cs typeface="B Nazanin" panose="00000400000000000000" pitchFamily="2" charset="-78"/>
+            </a:endParaRPr>
+          </a:p>
+          <a:p>
+            <a:pPr marL="457200" lvl="0" indent="-457200" algn="r" rtl="1">
+              <a:buFont typeface="+mj-lt"/>
+              <a:buAutoNum type="arabicPeriod"/>
+            </a:pPr>
+            <a:r>
+              <a:rPr lang="fa-IR" sz="2400" dirty="0">
+                <a:cs typeface="B Nazanin" panose="00000400000000000000" pitchFamily="2" charset="-78"/>
+              </a:rPr>
+              <a:t>آماده سازی یک نقشه گوسی دو بعدی</a:t>
+            </a:r>
+            <a:endParaRPr lang="en-US" sz="2400" dirty="0">
+              <a:cs typeface="B Nazanin" panose="00000400000000000000" pitchFamily="2" charset="-78"/>
+            </a:endParaRPr>
+          </a:p>
+          <a:p>
+            <a:pPr marL="457200" lvl="0" indent="-457200" algn="r" rtl="1">
+              <a:buFont typeface="+mj-lt"/>
+              <a:buAutoNum type="arabicPeriod"/>
+            </a:pPr>
+            <a:r>
+              <a:rPr lang="fa-IR" sz="2400" dirty="0">
+                <a:cs typeface="B Nazanin" panose="00000400000000000000" pitchFamily="2" charset="-78"/>
+              </a:rPr>
+              <a:t>محاسبه یک تبدیل </a:t>
+            </a:r>
+            <a:r>
+              <a:rPr lang="en-US" sz="2400" dirty="0">
+                <a:cs typeface="B Nazanin" panose="00000400000000000000" pitchFamily="2" charset="-78"/>
+              </a:rPr>
+              <a:t>perspective </a:t>
+            </a:r>
+            <a:r>
+              <a:rPr lang="fa-IR" sz="2400" dirty="0">
+                <a:cs typeface="B Nazanin" panose="00000400000000000000" pitchFamily="2" charset="-78"/>
+              </a:rPr>
+              <a:t>بین نقشه گوسی ناحیه ای و هر </a:t>
+            </a:r>
+            <a:r>
+              <a:rPr lang="en-US" sz="2400" dirty="0">
+                <a:cs typeface="B Nazanin" panose="00000400000000000000" pitchFamily="2" charset="-78"/>
+              </a:rPr>
+              <a:t>box</a:t>
+            </a:r>
+            <a:r>
+              <a:rPr lang="fa-IR" sz="2400" dirty="0">
+                <a:cs typeface="B Nazanin" panose="00000400000000000000" pitchFamily="2" charset="-78"/>
+              </a:rPr>
+              <a:t> کاراکتر</a:t>
+            </a:r>
+            <a:endParaRPr lang="en-US" sz="2400" dirty="0">
+              <a:cs typeface="B Nazanin" panose="00000400000000000000" pitchFamily="2" charset="-78"/>
+            </a:endParaRPr>
+          </a:p>
+          <a:p>
+            <a:pPr marL="457200" lvl="0" indent="-457200" algn="r" rtl="1">
+              <a:buFont typeface="+mj-lt"/>
+              <a:buAutoNum type="arabicPeriod"/>
+            </a:pPr>
+            <a:r>
+              <a:rPr lang="fa-IR" sz="2400" dirty="0">
+                <a:cs typeface="B Nazanin" panose="00000400000000000000" pitchFamily="2" charset="-78"/>
+              </a:rPr>
+              <a:t>نگاشت هر توزیع گوسی به </a:t>
+            </a:r>
+            <a:r>
+              <a:rPr lang="en-US" sz="2400" dirty="0">
+                <a:cs typeface="B Nazanin" panose="00000400000000000000" pitchFamily="2" charset="-78"/>
+              </a:rPr>
+              <a:t>box</a:t>
+            </a:r>
+            <a:r>
+              <a:rPr lang="fa-IR" sz="2400" dirty="0">
+                <a:cs typeface="B Nazanin" panose="00000400000000000000" pitchFamily="2" charset="-78"/>
+              </a:rPr>
+              <a:t> هر ناحیه</a:t>
+            </a:r>
+            <a:endParaRPr lang="en-US" sz="2400" dirty="0">
+              <a:cs typeface="B Nazanin" panose="00000400000000000000" pitchFamily="2" charset="-78"/>
+            </a:endParaRPr>
+          </a:p>
+          <a:p>
+            <a:pPr algn="r"/>
+            <a:endParaRPr lang="en-US" dirty="0">
+              <a:cs typeface="B Nazanin" panose="00000400000000000000" pitchFamily="2" charset="-78"/>
+            </a:endParaRPr>
+          </a:p>
+        </p:txBody>
+      </p:sp>
+      <p:sp>
+        <p:nvSpPr>
+          <p:cNvPr id="4" name="Slide Number Placeholder 3"/>
+          <p:cNvSpPr>
+            <a:spLocks noGrp="1"/>
+          </p:cNvSpPr>
+          <p:nvPr>
+            <p:ph type="sldNum" sz="quarter" idx="12"/>
+          </p:nvPr>
+        </p:nvSpPr>
+        <p:spPr/>
+        <p:txBody>
+          <a:bodyPr/>
+          <a:lstStyle/>
+          <a:p>
+            <a:fld id="{18087783-62FF-446C-A2E4-4C6B0B0DE16F}" type="slidenum">
+              <a:rPr lang="en-US" smtClean="0"/>
+              <a:t>30</a:t>
+            </a:fld>
+            <a:endParaRPr lang="en-US"/>
+          </a:p>
+        </p:txBody>
+      </p:sp>
+    </p:spTree>
+    <p:extLst>
+      <p:ext uri="{BB962C8B-B14F-4D97-AF65-F5344CB8AC3E}">
+        <p14:creationId xmlns:p14="http://schemas.microsoft.com/office/powerpoint/2010/main" val="1108825624"/>
+      </p:ext>
+    </p:extLst>
+  </p:cSld>
+  <p:clrMapOvr>
+    <a:masterClrMapping/>
+  </p:clrMapOvr>
+  <p:timing>
+    <p:tnLst>
+      <p:par>
+        <p:cTn id="1" dur="indefinite" restart="never" nodeType="tmRoot">
+          <p:childTnLst>
+            <p:seq concurrent="1" nextAc="seek">
+              <p:cTn id="2" dur="indefinite" nodeType="mainSeq">
+                <p:childTnLst>
+                  <p:par>
+                    <p:cTn id="3" fill="hold">
+                      <p:stCondLst>
+                        <p:cond delay="indefinite"/>
+                      </p:stCondLst>
+                      <p:childTnLst>
+                        <p:par>
+                          <p:cTn id="4" fill="hold">
+                            <p:stCondLst>
+                              <p:cond delay="0"/>
+                            </p:stCondLst>
+                            <p:childTnLst>
+                              <p:par>
+                                <p:cTn id="5" presetID="10" presetClass="entr" presetSubtype="0" fill="hold" nodeType="clickEffect">
+                                  <p:stCondLst>
+                                    <p:cond delay="0"/>
+                                  </p:stCondLst>
+                                  <p:childTnLst>
+                                    <p:set>
+                                      <p:cBhvr>
+                                        <p:cTn id="6" dur="1" fill="hold">
+                                          <p:stCondLst>
+                                            <p:cond delay="0"/>
+                                          </p:stCondLst>
+                                        </p:cTn>
+                                        <p:tgtEl>
+                                          <p:spTgt spid="3">
+                                            <p:txEl>
+                                              <p:pRg st="0" end="0"/>
+                                            </p:txEl>
+                                          </p:spTgt>
+                                        </p:tgtEl>
+                                        <p:attrNameLst>
+                                          <p:attrName>style.visibility</p:attrName>
+                                        </p:attrNameLst>
+                                      </p:cBhvr>
+                                      <p:to>
+                                        <p:strVal val="visible"/>
+                                      </p:to>
+                                    </p:set>
+                                    <p:animEffect transition="in" filter="fade">
+                                      <p:cBhvr>
+                                        <p:cTn id="7" dur="500"/>
+                                        <p:tgtEl>
+                                          <p:spTgt spid="3">
+                                            <p:txEl>
+                                              <p:pRg st="0" end="0"/>
+                                            </p:txEl>
+                                          </p:spTgt>
+                                        </p:tgtEl>
+                                      </p:cBhvr>
+                                    </p:animEffect>
+                                  </p:childTnLst>
+                                </p:cTn>
+                              </p:par>
+                            </p:childTnLst>
+                          </p:cTn>
+                        </p:par>
+                      </p:childTnLst>
+                    </p:cTn>
+                  </p:par>
+                  <p:par>
+                    <p:cTn id="8" fill="hold">
+                      <p:stCondLst>
+                        <p:cond delay="indefinite"/>
+                      </p:stCondLst>
+                      <p:childTnLst>
+                        <p:par>
+                          <p:cTn id="9" fill="hold">
+                            <p:stCondLst>
+                              <p:cond delay="0"/>
+                            </p:stCondLst>
+                            <p:childTnLst>
+                              <p:par>
+                                <p:cTn id="10" presetID="10" presetClass="entr" presetSubtype="0" fill="hold" nodeType="clickEffect">
+                                  <p:stCondLst>
+                                    <p:cond delay="0"/>
+                                  </p:stCondLst>
+                                  <p:childTnLst>
+                                    <p:set>
+                                      <p:cBhvr>
+                                        <p:cTn id="11" dur="1" fill="hold">
+                                          <p:stCondLst>
+                                            <p:cond delay="0"/>
+                                          </p:stCondLst>
+                                        </p:cTn>
+                                        <p:tgtEl>
+                                          <p:spTgt spid="3">
+                                            <p:txEl>
+                                              <p:pRg st="1" end="1"/>
+                                            </p:txEl>
+                                          </p:spTgt>
+                                        </p:tgtEl>
+                                        <p:attrNameLst>
+                                          <p:attrName>style.visibility</p:attrName>
+                                        </p:attrNameLst>
+                                      </p:cBhvr>
+                                      <p:to>
+                                        <p:strVal val="visible"/>
+                                      </p:to>
+                                    </p:set>
+                                    <p:animEffect transition="in" filter="fade">
+                                      <p:cBhvr>
+                                        <p:cTn id="12" dur="500"/>
+                                        <p:tgtEl>
+                                          <p:spTgt spid="3">
+                                            <p:txEl>
+                                              <p:pRg st="1" end="1"/>
+                                            </p:txEl>
+                                          </p:spTgt>
+                                        </p:tgtEl>
+                                      </p:cBhvr>
+                                    </p:animEffect>
+                                  </p:childTnLst>
+                                </p:cTn>
+                              </p:par>
+                            </p:childTnLst>
+                          </p:cTn>
+                        </p:par>
+                      </p:childTnLst>
+                    </p:cTn>
+                  </p:par>
+                  <p:par>
+                    <p:cTn id="13" fill="hold">
+                      <p:stCondLst>
+                        <p:cond delay="indefinite"/>
+                      </p:stCondLst>
+                      <p:childTnLst>
+                        <p:par>
+                          <p:cTn id="14" fill="hold">
+                            <p:stCondLst>
+                              <p:cond delay="0"/>
+                            </p:stCondLst>
+                            <p:childTnLst>
+                              <p:par>
+                                <p:cTn id="15" presetID="10" presetClass="entr" presetSubtype="0" fill="hold" nodeType="clickEffect">
+                                  <p:stCondLst>
+                                    <p:cond delay="0"/>
+                                  </p:stCondLst>
+                                  <p:childTnLst>
+                                    <p:set>
+                                      <p:cBhvr>
+                                        <p:cTn id="16" dur="1" fill="hold">
+                                          <p:stCondLst>
+                                            <p:cond delay="0"/>
+                                          </p:stCondLst>
+                                        </p:cTn>
+                                        <p:tgtEl>
+                                          <p:spTgt spid="3">
+                                            <p:txEl>
+                                              <p:pRg st="2" end="2"/>
+                                            </p:txEl>
+                                          </p:spTgt>
+                                        </p:tgtEl>
+                                        <p:attrNameLst>
+                                          <p:attrName>style.visibility</p:attrName>
+                                        </p:attrNameLst>
+                                      </p:cBhvr>
+                                      <p:to>
+                                        <p:strVal val="visible"/>
+                                      </p:to>
+                                    </p:set>
+                                    <p:animEffect transition="in" filter="fade">
+                                      <p:cBhvr>
+                                        <p:cTn id="17" dur="500"/>
+                                        <p:tgtEl>
+                                          <p:spTgt spid="3">
+                                            <p:txEl>
+                                              <p:pRg st="2" end="2"/>
+                                            </p:txEl>
+                                          </p:spTgt>
+                                        </p:tgtEl>
+                                      </p:cBhvr>
+                                    </p:animEffect>
+                                  </p:childTnLst>
+                                </p:cTn>
+                              </p:par>
+                            </p:childTnLst>
+                          </p:cTn>
+                        </p:par>
+                      </p:childTnLst>
+                    </p:cTn>
+                  </p:par>
+                  <p:par>
+                    <p:cTn id="18" fill="hold">
+                      <p:stCondLst>
+                        <p:cond delay="indefinite"/>
+                      </p:stCondLst>
+                      <p:childTnLst>
+                        <p:par>
+                          <p:cTn id="19" fill="hold">
+                            <p:stCondLst>
+                              <p:cond delay="0"/>
+                            </p:stCondLst>
+                            <p:childTnLst>
+                              <p:par>
+                                <p:cTn id="20" presetID="10" presetClass="entr" presetSubtype="0" fill="hold" nodeType="clickEffect">
+                                  <p:stCondLst>
+                                    <p:cond delay="0"/>
+                                  </p:stCondLst>
+                                  <p:childTnLst>
+                                    <p:set>
+                                      <p:cBhvr>
+                                        <p:cTn id="21" dur="1" fill="hold">
+                                          <p:stCondLst>
+                                            <p:cond delay="0"/>
+                                          </p:stCondLst>
+                                        </p:cTn>
+                                        <p:tgtEl>
+                                          <p:spTgt spid="3">
+                                            <p:txEl>
+                                              <p:pRg st="3" end="3"/>
+                                            </p:txEl>
+                                          </p:spTgt>
+                                        </p:tgtEl>
+                                        <p:attrNameLst>
+                                          <p:attrName>style.visibility</p:attrName>
+                                        </p:attrNameLst>
+                                      </p:cBhvr>
+                                      <p:to>
+                                        <p:strVal val="visible"/>
+                                      </p:to>
+                                    </p:set>
+                                    <p:animEffect transition="in" filter="fade">
+                                      <p:cBhvr>
+                                        <p:cTn id="22" dur="500"/>
+                                        <p:tgtEl>
+                                          <p:spTgt spid="3">
+                                            <p:txEl>
+                                              <p:pRg st="3" end="3"/>
+                                            </p:txEl>
+                                          </p:spTgt>
+                                        </p:tgtEl>
+                                      </p:cBhvr>
+                                    </p:animEffect>
+                                  </p:childTnLst>
+                                </p:cTn>
+                              </p:par>
+                            </p:childTnLst>
+                          </p:cTn>
+                        </p:par>
+                      </p:childTnLst>
+                    </p:cTn>
+                  </p:par>
+                </p:childTnLst>
+              </p:cTn>
+              <p:prevCondLst>
+                <p:cond evt="onPrev" delay="0">
+                  <p:tgtEl>
+                    <p:sldTgt/>
+                  </p:tgtEl>
+                </p:cond>
+              </p:prevCondLst>
+              <p:nextCondLst>
+                <p:cond evt="onNext" delay="0">
+                  <p:tgtEl>
+                    <p:sldTgt/>
+                  </p:tgtEl>
+                </p:cond>
+              </p:nextCondLst>
+            </p:seq>
+          </p:childTnLst>
+        </p:cTn>
+      </p:par>
+    </p:tnLst>
+  </p:timing>
+</p:sld>
+</file>
+
+<file path=ppt/slides/slide31.xml><?xml version="1.0" encoding="utf-8"?>
+<p:sld xmlns:a="http://schemas.openxmlformats.org/drawingml/2006/main" xmlns:r="http://schemas.openxmlformats.org/officeDocument/2006/relationships" xmlns:p="http://schemas.openxmlformats.org/presentationml/2006/main">
+  <p:cSld>
+    <p:spTree>
+      <p:nvGrpSpPr>
+        <p:cNvPr id="1" name=""/>
+        <p:cNvGrpSpPr/>
+        <p:nvPr/>
+      </p:nvGrpSpPr>
+      <p:grpSpPr>
+        <a:xfrm>
+          <a:off x="0" y="0"/>
+          <a:ext cx="0" cy="0"/>
+          <a:chOff x="0" y="0"/>
+          <a:chExt cx="0" cy="0"/>
+        </a:xfrm>
+      </p:grpSpPr>
+      <p:sp>
+        <p:nvSpPr>
+          <p:cNvPr id="2" name="Title 1"/>
+          <p:cNvSpPr>
+            <a:spLocks noGrp="1"/>
+          </p:cNvSpPr>
+          <p:nvPr>
+            <p:ph type="title"/>
+          </p:nvPr>
+        </p:nvSpPr>
+        <p:spPr/>
+        <p:txBody>
+          <a:bodyPr/>
+          <a:lstStyle/>
+          <a:p>
+            <a:pPr lvl="0" algn="r"/>
+            <a:r>
+              <a:rPr lang="en-US" dirty="0"/>
+              <a:t>Weakly-Supervised </a:t>
+            </a:r>
+            <a:r>
+              <a:rPr lang="en-US" dirty="0" smtClean="0"/>
+              <a:t>Learning</a:t>
+            </a:r>
+            <a:endParaRPr lang="en-US" dirty="0"/>
+          </a:p>
+        </p:txBody>
+      </p:sp>
+      <p:sp>
+        <p:nvSpPr>
+          <p:cNvPr id="3" name="Content Placeholder 2"/>
+          <p:cNvSpPr>
+            <a:spLocks noGrp="1"/>
+          </p:cNvSpPr>
+          <p:nvPr>
+            <p:ph idx="1"/>
+          </p:nvPr>
+        </p:nvSpPr>
+        <p:spPr/>
+        <p:txBody>
+          <a:bodyPr>
+            <a:normAutofit/>
+          </a:bodyPr>
+          <a:lstStyle/>
+          <a:p>
+            <a:pPr algn="just" rtl="1"/>
+            <a:r>
+              <a:rPr lang="fa-IR" dirty="0">
+                <a:cs typeface="B Nazanin" panose="00000400000000000000" pitchFamily="2" charset="-78"/>
+              </a:rPr>
+              <a:t>در این بخش، از تصاویر واقعی که در آن ها فقط </a:t>
+            </a:r>
+            <a:r>
+              <a:rPr lang="en-US" dirty="0">
+                <a:cs typeface="B Nazanin" panose="00000400000000000000" pitchFamily="2" charset="-78"/>
+              </a:rPr>
+              <a:t>box</a:t>
+            </a:r>
+            <a:r>
+              <a:rPr lang="fa-IR" dirty="0">
+                <a:cs typeface="B Nazanin" panose="00000400000000000000" pitchFamily="2" charset="-78"/>
+              </a:rPr>
+              <a:t> متن ها مشخص شده است، استفاده کرده و </a:t>
+            </a:r>
+            <a:r>
+              <a:rPr lang="en-US" dirty="0">
+                <a:cs typeface="B Nazanin" panose="00000400000000000000" pitchFamily="2" charset="-78"/>
+              </a:rPr>
+              <a:t>box</a:t>
+            </a:r>
+            <a:r>
+              <a:rPr lang="fa-IR" dirty="0">
+                <a:cs typeface="B Nazanin" panose="00000400000000000000" pitchFamily="2" charset="-78"/>
+              </a:rPr>
+              <a:t> کاراکتر های آن متن را به دست می آورد. با این یادگیری، با استفاده از</a:t>
+            </a:r>
+            <a:r>
+              <a:rPr lang="en-US" dirty="0">
+                <a:cs typeface="B Nazanin" panose="00000400000000000000" pitchFamily="2" charset="-78"/>
+              </a:rPr>
+              <a:t>region score</a:t>
+            </a:r>
+            <a:r>
+              <a:rPr lang="fa-IR" dirty="0">
+                <a:cs typeface="B Nazanin" panose="00000400000000000000" pitchFamily="2" charset="-78"/>
+              </a:rPr>
+              <a:t> که برای هر بخش از تصویر بریده شده متن به دست می آید، می توان </a:t>
+            </a:r>
+            <a:r>
+              <a:rPr lang="en-US" dirty="0">
+                <a:cs typeface="B Nazanin" panose="00000400000000000000" pitchFamily="2" charset="-78"/>
+              </a:rPr>
+              <a:t>bounding box</a:t>
+            </a:r>
+            <a:r>
+              <a:rPr lang="fa-IR" dirty="0">
+                <a:cs typeface="B Nazanin" panose="00000400000000000000" pitchFamily="2" charset="-78"/>
+              </a:rPr>
+              <a:t> را برای هر کاراکتر در تصاویر واقعی به عنوان برچسب تولید کرد. </a:t>
+            </a:r>
+            <a:endParaRPr lang="en-US" dirty="0">
+              <a:cs typeface="B Nazanin" panose="00000400000000000000" pitchFamily="2" charset="-78"/>
+            </a:endParaRPr>
+          </a:p>
+        </p:txBody>
+      </p:sp>
+      <p:sp>
+        <p:nvSpPr>
+          <p:cNvPr id="4" name="Slide Number Placeholder 3"/>
+          <p:cNvSpPr>
+            <a:spLocks noGrp="1"/>
+          </p:cNvSpPr>
+          <p:nvPr>
+            <p:ph type="sldNum" sz="quarter" idx="12"/>
+          </p:nvPr>
+        </p:nvSpPr>
+        <p:spPr/>
+        <p:txBody>
+          <a:bodyPr/>
+          <a:lstStyle/>
+          <a:p>
+            <a:fld id="{18087783-62FF-446C-A2E4-4C6B0B0DE16F}" type="slidenum">
+              <a:rPr lang="en-US" smtClean="0"/>
+              <a:t>31</a:t>
+            </a:fld>
+            <a:endParaRPr lang="en-US"/>
+          </a:p>
+        </p:txBody>
+      </p:sp>
+      <p:pic>
+        <p:nvPicPr>
+          <p:cNvPr id="5" name="Picture 4"/>
+          <p:cNvPicPr/>
+          <p:nvPr/>
+        </p:nvPicPr>
+        <p:blipFill>
+          <a:blip r:embed="rId2"/>
+          <a:stretch>
+            <a:fillRect/>
+          </a:stretch>
+        </p:blipFill>
+        <p:spPr>
+          <a:xfrm>
+            <a:off x="1097280" y="2781206"/>
+            <a:ext cx="8087593" cy="3505295"/>
+          </a:xfrm>
+          <a:prstGeom prst="rect">
+            <a:avLst/>
+          </a:prstGeom>
+        </p:spPr>
+      </p:pic>
+    </p:spTree>
+    <p:extLst>
+      <p:ext uri="{BB962C8B-B14F-4D97-AF65-F5344CB8AC3E}">
+        <p14:creationId xmlns:p14="http://schemas.microsoft.com/office/powerpoint/2010/main" val="3702173842"/>
+      </p:ext>
+    </p:extLst>
+  </p:cSld>
+  <p:clrMapOvr>
+    <a:masterClrMapping/>
+  </p:clrMapOvr>
+  <p:timing>
+    <p:tnLst>
+      <p:par>
+        <p:cTn id="1" dur="indefinite" restart="never" nodeType="tmRoot">
+          <p:childTnLst>
+            <p:seq concurrent="1" nextAc="seek">
+              <p:cTn id="2" dur="indefinite" nodeType="mainSeq">
+                <p:childTnLst>
+                  <p:par>
+                    <p:cTn id="3" fill="hold">
+                      <p:stCondLst>
+                        <p:cond delay="indefinite"/>
+                      </p:stCondLst>
+                      <p:childTnLst>
+                        <p:par>
+                          <p:cTn id="4" fill="hold">
+                            <p:stCondLst>
+                              <p:cond delay="0"/>
+                            </p:stCondLst>
+                            <p:childTnLst>
+                              <p:par>
+                                <p:cTn id="5" presetID="10" presetClass="entr" presetSubtype="0" fill="hold" nodeType="clickEffect">
+                                  <p:stCondLst>
+                                    <p:cond delay="0"/>
+                                  </p:stCondLst>
+                                  <p:childTnLst>
+                                    <p:set>
+                                      <p:cBhvr>
+                                        <p:cTn id="6" dur="1" fill="hold">
+                                          <p:stCondLst>
+                                            <p:cond delay="0"/>
+                                          </p:stCondLst>
+                                        </p:cTn>
+                                        <p:tgtEl>
+                                          <p:spTgt spid="3">
+                                            <p:txEl>
+                                              <p:pRg st="0" end="0"/>
+                                            </p:txEl>
+                                          </p:spTgt>
+                                        </p:tgtEl>
+                                        <p:attrNameLst>
+                                          <p:attrName>style.visibility</p:attrName>
+                                        </p:attrNameLst>
+                                      </p:cBhvr>
+                                      <p:to>
+                                        <p:strVal val="visible"/>
+                                      </p:to>
+                                    </p:set>
+                                    <p:animEffect transition="in" filter="fade">
+                                      <p:cBhvr>
+                                        <p:cTn id="7" dur="500"/>
+                                        <p:tgtEl>
+                                          <p:spTgt spid="3">
+                                            <p:txEl>
+                                              <p:pRg st="0" end="0"/>
+                                            </p:txEl>
+                                          </p:spTgt>
+                                        </p:tgtEl>
+                                      </p:cBhvr>
+                                    </p:animEffect>
+                                  </p:childTnLst>
+                                </p:cTn>
+                              </p:par>
+                            </p:childTnLst>
+                          </p:cTn>
+                        </p:par>
+                      </p:childTnLst>
+                    </p:cTn>
+                  </p:par>
+                  <p:par>
+                    <p:cTn id="8" fill="hold">
+                      <p:stCondLst>
+                        <p:cond delay="indefinite"/>
+                      </p:stCondLst>
+                      <p:childTnLst>
+                        <p:par>
+                          <p:cTn id="9" fill="hold">
+                            <p:stCondLst>
+                              <p:cond delay="0"/>
+                            </p:stCondLst>
+                            <p:childTnLst>
+                              <p:par>
+                                <p:cTn id="10" presetID="10" presetClass="entr" presetSubtype="0" fill="hold" nodeType="clickEffect">
+                                  <p:stCondLst>
+                                    <p:cond delay="0"/>
+                                  </p:stCondLst>
+                                  <p:childTnLst>
+                                    <p:set>
+                                      <p:cBhvr>
+                                        <p:cTn id="11" dur="1" fill="hold">
+                                          <p:stCondLst>
+                                            <p:cond delay="0"/>
+                                          </p:stCondLst>
+                                        </p:cTn>
+                                        <p:tgtEl>
+                                          <p:spTgt spid="5"/>
+                                        </p:tgtEl>
+                                        <p:attrNameLst>
+                                          <p:attrName>style.visibility</p:attrName>
+                                        </p:attrNameLst>
+                                      </p:cBhvr>
+                                      <p:to>
+                                        <p:strVal val="visible"/>
+                                      </p:to>
+                                    </p:set>
+                                    <p:animEffect transition="in" filter="fade">
+                                      <p:cBhvr>
+                                        <p:cTn id="12" dur="500"/>
+                                        <p:tgtEl>
+                                          <p:spTgt spid="5"/>
+                                        </p:tgtEl>
+                                      </p:cBhvr>
+                                    </p:animEffect>
+                                  </p:childTnLst>
+                                </p:cTn>
+                              </p:par>
+                            </p:childTnLst>
+                          </p:cTn>
+                        </p:par>
+                      </p:childTnLst>
+                    </p:cTn>
+                  </p:par>
+                </p:childTnLst>
+              </p:cTn>
+              <p:prevCondLst>
+                <p:cond evt="onPrev" delay="0">
+                  <p:tgtEl>
+                    <p:sldTgt/>
+                  </p:tgtEl>
+                </p:cond>
+              </p:prevCondLst>
+              <p:nextCondLst>
+                <p:cond evt="onNext" delay="0">
+                  <p:tgtEl>
+                    <p:sldTgt/>
+                  </p:tgtEl>
+                </p:cond>
+              </p:nextCondLst>
+            </p:seq>
+          </p:childTnLst>
+        </p:cTn>
+      </p:par>
+    </p:tnLst>
+  </p:timing>
+</p:sld>
+</file>
+
+<file path=ppt/slides/slide32.xml><?xml version="1.0" encoding="utf-8"?>
+<p:sld xmlns:a="http://schemas.openxmlformats.org/drawingml/2006/main" xmlns:r="http://schemas.openxmlformats.org/officeDocument/2006/relationships" xmlns:p="http://schemas.openxmlformats.org/presentationml/2006/main">
+  <p:cSld>
+    <p:spTree>
+      <p:nvGrpSpPr>
+        <p:cNvPr id="1" name=""/>
+        <p:cNvGrpSpPr/>
+        <p:nvPr/>
+      </p:nvGrpSpPr>
+      <p:grpSpPr>
+        <a:xfrm>
+          <a:off x="0" y="0"/>
+          <a:ext cx="0" cy="0"/>
+          <a:chOff x="0" y="0"/>
+          <a:chExt cx="0" cy="0"/>
+        </a:xfrm>
+      </p:grpSpPr>
+      <p:sp>
+        <p:nvSpPr>
+          <p:cNvPr id="2" name="Title 1"/>
+          <p:cNvSpPr>
+            <a:spLocks noGrp="1"/>
+          </p:cNvSpPr>
+          <p:nvPr>
+            <p:ph type="title"/>
+          </p:nvPr>
+        </p:nvSpPr>
+        <p:spPr/>
+        <p:txBody>
+          <a:bodyPr/>
+          <a:lstStyle/>
+          <a:p>
+            <a:pPr algn="r" rtl="1"/>
+            <a:r>
+              <a:rPr lang="en-US" dirty="0"/>
+              <a:t>Weakly-Supervised Learning</a:t>
+            </a:r>
+          </a:p>
+        </p:txBody>
+      </p:sp>
+      <p:sp>
+        <p:nvSpPr>
+          <p:cNvPr id="3" name="Content Placeholder 2"/>
+          <p:cNvSpPr>
+            <a:spLocks noGrp="1"/>
+          </p:cNvSpPr>
+          <p:nvPr>
+            <p:ph idx="1"/>
+          </p:nvPr>
+        </p:nvSpPr>
+        <p:spPr/>
+        <p:txBody>
+          <a:bodyPr>
+            <a:normAutofit/>
+          </a:bodyPr>
+          <a:lstStyle/>
+          <a:p>
+            <a:pPr algn="r" rtl="1"/>
+            <a:r>
+              <a:rPr lang="fa-IR" sz="2400" dirty="0">
+                <a:cs typeface="B Nazanin" panose="00000400000000000000" pitchFamily="2" charset="-78"/>
+              </a:rPr>
+              <a:t>روند جداسازی کاراکترها دارای 4 مرحله است:</a:t>
+            </a:r>
+            <a:endParaRPr lang="en-US" sz="2400" dirty="0">
+              <a:cs typeface="B Nazanin" panose="00000400000000000000" pitchFamily="2" charset="-78"/>
+            </a:endParaRPr>
+          </a:p>
+          <a:p>
+            <a:pPr lvl="0" algn="r" rtl="1"/>
+            <a:r>
+              <a:rPr lang="fa-IR" sz="2400" dirty="0">
+                <a:cs typeface="B Nazanin" panose="00000400000000000000" pitchFamily="2" charset="-78"/>
+              </a:rPr>
+              <a:t>بخش های دارای متن از تصویر ورودی بریده  می شود.</a:t>
+            </a:r>
+            <a:endParaRPr lang="en-US" sz="2400" dirty="0">
+              <a:cs typeface="B Nazanin" panose="00000400000000000000" pitchFamily="2" charset="-78"/>
+            </a:endParaRPr>
+          </a:p>
+          <a:p>
+            <a:pPr lvl="0" algn="r" rtl="1"/>
+            <a:r>
+              <a:rPr lang="fa-IR" sz="2400" dirty="0">
+                <a:cs typeface="B Nazanin" panose="00000400000000000000" pitchFamily="2" charset="-78"/>
+              </a:rPr>
+              <a:t>مدل برای پیش بینی </a:t>
+            </a:r>
+            <a:r>
+              <a:rPr lang="en-US" sz="2400" dirty="0">
+                <a:cs typeface="B Nazanin" panose="00000400000000000000" pitchFamily="2" charset="-78"/>
+              </a:rPr>
+              <a:t>region score</a:t>
+            </a:r>
+            <a:r>
+              <a:rPr lang="fa-IR" sz="2400" dirty="0">
+                <a:cs typeface="B Nazanin" panose="00000400000000000000" pitchFamily="2" charset="-78"/>
+              </a:rPr>
+              <a:t> آموزش می بیند.</a:t>
+            </a:r>
+            <a:endParaRPr lang="en-US" sz="2400" dirty="0">
+              <a:cs typeface="B Nazanin" panose="00000400000000000000" pitchFamily="2" charset="-78"/>
+            </a:endParaRPr>
+          </a:p>
+          <a:p>
+            <a:pPr lvl="0" algn="r" rtl="1"/>
+            <a:r>
+              <a:rPr lang="fa-IR" sz="2400" dirty="0">
+                <a:cs typeface="B Nazanin" panose="00000400000000000000" pitchFamily="2" charset="-78"/>
+              </a:rPr>
+              <a:t>الگوریتم </a:t>
+            </a:r>
+            <a:r>
+              <a:rPr lang="en-US" sz="2400" dirty="0" err="1">
+                <a:cs typeface="B Nazanin" panose="00000400000000000000" pitchFamily="2" charset="-78"/>
+              </a:rPr>
+              <a:t>watershid</a:t>
+            </a:r>
+            <a:r>
+              <a:rPr lang="fa-IR" sz="2400" dirty="0">
+                <a:cs typeface="B Nazanin" panose="00000400000000000000" pitchFamily="2" charset="-78"/>
+              </a:rPr>
+              <a:t> برای جداسازی ناحیه های کاراکتر استفاده می شود.</a:t>
+            </a:r>
+            <a:endParaRPr lang="en-US" sz="2400" dirty="0">
+              <a:cs typeface="B Nazanin" panose="00000400000000000000" pitchFamily="2" charset="-78"/>
+            </a:endParaRPr>
+          </a:p>
+          <a:p>
+            <a:pPr lvl="0" algn="r" rtl="1"/>
+            <a:r>
+              <a:rPr lang="fa-IR" sz="2400" dirty="0">
+                <a:cs typeface="B Nazanin" panose="00000400000000000000" pitchFamily="2" charset="-78"/>
+              </a:rPr>
+              <a:t>مختصات </a:t>
+            </a:r>
+            <a:r>
+              <a:rPr lang="en-US" sz="2400" dirty="0">
+                <a:cs typeface="B Nazanin" panose="00000400000000000000" pitchFamily="2" charset="-78"/>
+              </a:rPr>
+              <a:t>box</a:t>
+            </a:r>
+            <a:r>
+              <a:rPr lang="fa-IR" sz="2400" dirty="0">
+                <a:cs typeface="B Nazanin" panose="00000400000000000000" pitchFamily="2" charset="-78"/>
+              </a:rPr>
+              <a:t> کاراکترها با استفاده از تبدیل معکوس مرحله جداسازی، بر روی تصویر اصلی مشخص می شود.</a:t>
+            </a:r>
+            <a:endParaRPr lang="en-US" sz="2400" dirty="0">
+              <a:cs typeface="B Nazanin" panose="00000400000000000000" pitchFamily="2" charset="-78"/>
+            </a:endParaRPr>
+          </a:p>
+          <a:p>
+            <a:pPr algn="r" rtl="1"/>
+            <a:r>
+              <a:rPr lang="fa-IR" sz="2400" dirty="0">
+                <a:cs typeface="B Nazanin" panose="00000400000000000000" pitchFamily="2" charset="-78"/>
+              </a:rPr>
+              <a:t>این مراحل را در تصویر زیر می توان مشاهده کرد :</a:t>
+            </a:r>
+            <a:endParaRPr lang="en-US" sz="2400" dirty="0">
+              <a:cs typeface="B Nazanin" panose="00000400000000000000" pitchFamily="2" charset="-78"/>
+            </a:endParaRPr>
+          </a:p>
+          <a:p>
+            <a:pPr algn="r"/>
+            <a:endParaRPr lang="en-US" sz="2400" dirty="0">
+              <a:cs typeface="B Nazanin" panose="00000400000000000000" pitchFamily="2" charset="-78"/>
+            </a:endParaRPr>
+          </a:p>
+        </p:txBody>
+      </p:sp>
+      <p:sp>
+        <p:nvSpPr>
+          <p:cNvPr id="4" name="Slide Number Placeholder 3"/>
+          <p:cNvSpPr>
+            <a:spLocks noGrp="1"/>
+          </p:cNvSpPr>
+          <p:nvPr>
+            <p:ph type="sldNum" sz="quarter" idx="12"/>
+          </p:nvPr>
+        </p:nvSpPr>
+        <p:spPr/>
+        <p:txBody>
+          <a:bodyPr/>
+          <a:lstStyle/>
+          <a:p>
+            <a:fld id="{18087783-62FF-446C-A2E4-4C6B0B0DE16F}" type="slidenum">
+              <a:rPr lang="en-US" smtClean="0"/>
+              <a:t>32</a:t>
+            </a:fld>
+            <a:endParaRPr lang="en-US"/>
+          </a:p>
+        </p:txBody>
+      </p:sp>
+    </p:spTree>
+    <p:extLst>
+      <p:ext uri="{BB962C8B-B14F-4D97-AF65-F5344CB8AC3E}">
+        <p14:creationId xmlns:p14="http://schemas.microsoft.com/office/powerpoint/2010/main" val="3630603514"/>
+      </p:ext>
+    </p:extLst>
+  </p:cSld>
+  <p:clrMapOvr>
+    <a:masterClrMapping/>
+  </p:clrMapOvr>
+  <p:timing>
+    <p:tnLst>
+      <p:par>
+        <p:cTn id="1" dur="indefinite" restart="never" nodeType="tmRoot"/>
+      </p:par>
+    </p:tnLst>
+  </p:timing>
+</p:sld>
+</file>
+
 <file path=ppt/slides/slide4.xml><?xml version="1.0" encoding="utf-8"?>
 <p:sld xmlns:a="http://schemas.openxmlformats.org/drawingml/2006/main" xmlns:r="http://schemas.openxmlformats.org/officeDocument/2006/relationships" xmlns:p="http://schemas.openxmlformats.org/presentationml/2006/main">
   <p:cSld>
@@ -21107,13 +25019,19 @@
               <a:rPr lang="fa-IR" sz="2800" dirty="0" smtClean="0">
                 <a:cs typeface="B Nazanin" panose="00000400000000000000" pitchFamily="2" charset="-78"/>
               </a:rPr>
-              <a:t> ایده‌ی </a:t>
+              <a:t> </a:t>
+            </a:r>
+            <a:r>
+              <a:rPr lang="fa-IR" sz="2800" dirty="0" smtClean="0">
+                <a:cs typeface="B Nazanin" panose="00000400000000000000" pitchFamily="2" charset="-78"/>
+              </a:rPr>
+              <a:t>ایده‌ای که </a:t>
             </a:r>
             <a:r>
               <a:rPr lang="fa-IR" sz="2800" dirty="0">
                 <a:cs typeface="B Nazanin" panose="00000400000000000000" pitchFamily="2" charset="-78"/>
               </a:rPr>
-              <a:t>که در این مقاله مطرح </a:t>
+              <a:t>در این مقاله مطرح </a:t>
             </a:r>
             <a:r>
               <a:rPr lang="fa-IR" sz="2800" dirty="0" smtClean="0">
@@ -21898,7 +25816,7 @@
               <a:rPr lang="fa-IR" sz="2800" dirty="0" smtClean="0">
                 <a:cs typeface="B Nazanin" panose="00000400000000000000" pitchFamily="2" charset="-78"/>
               </a:rPr>
-              <a:t>بلاک‌های </a:t>
+              <a:t>بلوک‌های </a:t>
             </a:r>
             <a:r>
               <a:rPr lang="en-US" sz="2800" b="1" dirty="0">

</xml_diff>